<commit_message>
RU images for channel policies
Signed-off-by: Alexander Zemtsov <a.zemtsov@gmail.com>
</commit_message>
<xml_diff>
--- a/docs/locale/ru_RU/source/create_channel/Policy_images.pptx
+++ b/docs/locale/ru_RU/source/create_channel/Policy_images.pptx
@@ -202,7 +202,7 @@
           <a:p>
             <a:fld id="{76775A6B-2235-FD4C-9761-1C3FC61B7E71}" type="datetimeFigureOut">
               <a:rPr lang="en-US" smtClean="0"/>
-              <a:t>4/20/20</a:t>
+              <a:t>6/24/21</a:t>
             </a:fld>
             <a:endParaRPr lang="en-US"/>
           </a:p>
@@ -1120,7 +1120,7 @@
           <a:p>
             <a:fld id="{4A02AD6D-070E-DE4F-8312-C313D15CD54A}" type="datetimeFigureOut">
               <a:rPr lang="en-US" smtClean="0"/>
-              <a:t>4/20/20</a:t>
+              <a:t>6/24/21</a:t>
             </a:fld>
             <a:endParaRPr lang="en-US"/>
           </a:p>
@@ -1318,7 +1318,7 @@
           <a:p>
             <a:fld id="{4A02AD6D-070E-DE4F-8312-C313D15CD54A}" type="datetimeFigureOut">
               <a:rPr lang="en-US" smtClean="0"/>
-              <a:t>4/20/20</a:t>
+              <a:t>6/24/21</a:t>
             </a:fld>
             <a:endParaRPr lang="en-US"/>
           </a:p>
@@ -1526,7 +1526,7 @@
           <a:p>
             <a:fld id="{4A02AD6D-070E-DE4F-8312-C313D15CD54A}" type="datetimeFigureOut">
               <a:rPr lang="en-US" smtClean="0"/>
-              <a:t>4/20/20</a:t>
+              <a:t>6/24/21</a:t>
             </a:fld>
             <a:endParaRPr lang="en-US"/>
           </a:p>
@@ -1724,7 +1724,7 @@
           <a:p>
             <a:fld id="{4A02AD6D-070E-DE4F-8312-C313D15CD54A}" type="datetimeFigureOut">
               <a:rPr lang="en-US" smtClean="0"/>
-              <a:t>4/20/20</a:t>
+              <a:t>6/24/21</a:t>
             </a:fld>
             <a:endParaRPr lang="en-US"/>
           </a:p>
@@ -1999,7 +1999,7 @@
           <a:p>
             <a:fld id="{4A02AD6D-070E-DE4F-8312-C313D15CD54A}" type="datetimeFigureOut">
               <a:rPr lang="en-US" smtClean="0"/>
-              <a:t>4/20/20</a:t>
+              <a:t>6/24/21</a:t>
             </a:fld>
             <a:endParaRPr lang="en-US"/>
           </a:p>
@@ -2264,7 +2264,7 @@
           <a:p>
             <a:fld id="{4A02AD6D-070E-DE4F-8312-C313D15CD54A}" type="datetimeFigureOut">
               <a:rPr lang="en-US" smtClean="0"/>
-              <a:t>4/20/20</a:t>
+              <a:t>6/24/21</a:t>
             </a:fld>
             <a:endParaRPr lang="en-US"/>
           </a:p>
@@ -2676,7 +2676,7 @@
           <a:p>
             <a:fld id="{4A02AD6D-070E-DE4F-8312-C313D15CD54A}" type="datetimeFigureOut">
               <a:rPr lang="en-US" smtClean="0"/>
-              <a:t>4/20/20</a:t>
+              <a:t>6/24/21</a:t>
             </a:fld>
             <a:endParaRPr lang="en-US"/>
           </a:p>
@@ -2817,7 +2817,7 @@
           <a:p>
             <a:fld id="{4A02AD6D-070E-DE4F-8312-C313D15CD54A}" type="datetimeFigureOut">
               <a:rPr lang="en-US" smtClean="0"/>
-              <a:t>4/20/20</a:t>
+              <a:t>6/24/21</a:t>
             </a:fld>
             <a:endParaRPr lang="en-US"/>
           </a:p>
@@ -2930,7 +2930,7 @@
           <a:p>
             <a:fld id="{4A02AD6D-070E-DE4F-8312-C313D15CD54A}" type="datetimeFigureOut">
               <a:rPr lang="en-US" smtClean="0"/>
-              <a:t>4/20/20</a:t>
+              <a:t>6/24/21</a:t>
             </a:fld>
             <a:endParaRPr lang="en-US"/>
           </a:p>
@@ -3241,7 +3241,7 @@
           <a:p>
             <a:fld id="{4A02AD6D-070E-DE4F-8312-C313D15CD54A}" type="datetimeFigureOut">
               <a:rPr lang="en-US" smtClean="0"/>
-              <a:t>4/20/20</a:t>
+              <a:t>6/24/21</a:t>
             </a:fld>
             <a:endParaRPr lang="en-US"/>
           </a:p>
@@ -3529,7 +3529,7 @@
           <a:p>
             <a:fld id="{4A02AD6D-070E-DE4F-8312-C313D15CD54A}" type="datetimeFigureOut">
               <a:rPr lang="en-US" smtClean="0"/>
-              <a:t>4/20/20</a:t>
+              <a:t>6/24/21</a:t>
             </a:fld>
             <a:endParaRPr lang="en-US"/>
           </a:p>
@@ -3770,7 +3770,7 @@
           <a:p>
             <a:fld id="{4A02AD6D-070E-DE4F-8312-C313D15CD54A}" type="datetimeFigureOut">
               <a:rPr lang="en-US" smtClean="0"/>
-              <a:t>4/20/20</a:t>
+              <a:t>6/24/21</a:t>
             </a:fld>
             <a:endParaRPr lang="en-US"/>
           </a:p>
@@ -4203,7 +4203,7 @@
             <p:ph idx="1"/>
             <p:extLst>
               <p:ext uri="{D42A27DB-BD31-4B8C-83A1-F6EECF244321}">
-                <p14:modId xmlns:p14="http://schemas.microsoft.com/office/powerpoint/2010/main" val="3085802131"/>
+                <p14:modId xmlns:p14="http://schemas.microsoft.com/office/powerpoint/2010/main" val="1551197097"/>
               </p:ext>
             </p:extLst>
           </p:nvPr>
@@ -4235,15 +4235,20 @@
                     <a:p>
                       <a:pPr algn="ctr"/>
                       <a:r>
-                        <a:rPr lang="en-US" dirty="0"/>
-                        <a:t>Application policies</a:t>
-                      </a:r>
+                        <a:rPr lang="ru-RU" dirty="0"/>
+                        <a:t>Правила приложения</a:t>
+                      </a:r>
+                      <a:endParaRPr lang="en-US" dirty="0"/>
                     </a:p>
                     <a:p>
                       <a:pPr algn="ctr"/>
                       <a:r>
+                        <a:rPr lang="ru-RU" i="1" dirty="0"/>
+                        <a:t>Путь к правилам</a:t>
+                      </a:r>
+                      <a:r>
                         <a:rPr lang="en-US" i="1" dirty="0"/>
-                        <a:t>Policy path: Channel/Application</a:t>
+                        <a:t>: Channel/Application</a:t>
                       </a:r>
                     </a:p>
                   </a:txBody>
@@ -4306,22 +4311,50 @@
                     <a:p>
                       <a:pPr lvl="1"/>
                       <a:r>
-                        <a:rPr lang="en-US" sz="1600" dirty="0"/>
-                        <a:t>Policy Type: Implicit Meta</a:t>
+                        <a:rPr lang="ru-RU" sz="1600" dirty="0"/>
+                        <a:t>Тип правил</a:t>
+                      </a:r>
+                      <a:r>
+                        <a:rPr lang="en-US" sz="1600" dirty="0"/>
+                        <a:t>: Implicit</a:t>
+                      </a:r>
+                      <a:r>
+                        <a:rPr lang="ru-RU" sz="1600" dirty="0"/>
+                        <a:t> </a:t>
+                      </a:r>
+                      <a:r>
+                        <a:rPr lang="en-US" sz="1600" dirty="0"/>
+                        <a:t>Meta</a:t>
                       </a:r>
                     </a:p>
                     <a:p>
                       <a:pPr lvl="1"/>
                       <a:r>
-                        <a:rPr lang="en-US" sz="1600" dirty="0"/>
-                        <a:t>Rule: Majority Admins</a:t>
+                        <a:rPr lang="ru-RU" sz="1600" dirty="0"/>
+                        <a:t>Требование</a:t>
+                      </a:r>
+                      <a:r>
+                        <a:rPr lang="en-US" sz="1600" dirty="0"/>
+                        <a:t>: </a:t>
+                      </a:r>
+                      <a:r>
+                        <a:rPr lang="ru-RU" sz="1600" dirty="0"/>
+                        <a:t>Большинство с ролью </a:t>
+                      </a:r>
+                      <a:r>
+                        <a:rPr lang="en-US" sz="1600" dirty="0"/>
+                        <a:t>Admin</a:t>
                       </a:r>
                     </a:p>
                     <a:p>
                       <a:pPr lvl="1" algn="l"/>
                       <a:r>
+                        <a:rPr lang="ru-RU" sz="1600" i="1" dirty="0"/>
+                        <a:t>Путь</a:t>
+                      </a:r>
+                      <a:r>
                         <a:rPr lang="en-US" sz="1600" i="1" dirty="0"/>
-                        <a:t>Path: Channel/Application/Admins</a:t>
+                        <a:t>: Channel/Application/Admins</a:t>
                       </a:r>
                     </a:p>
                   </a:txBody>
@@ -4384,22 +4417,42 @@
                     <a:p>
                       <a:pPr lvl="1"/>
                       <a:r>
-                        <a:rPr lang="en-US" sz="1600" dirty="0"/>
-                        <a:t>Policy Type: Implicit Meta</a:t>
+                        <a:rPr lang="ru-RU" sz="1600" dirty="0"/>
+                        <a:t>Тип правил</a:t>
+                      </a:r>
+                      <a:r>
+                        <a:rPr lang="en-US" sz="1600" dirty="0"/>
+                        <a:t>: Implicit Meta</a:t>
                       </a:r>
                     </a:p>
                     <a:p>
                       <a:pPr lvl="1"/>
                       <a:r>
-                        <a:rPr lang="en-US" sz="1600" dirty="0"/>
-                        <a:t>Rule: Any Writers</a:t>
+                        <a:rPr lang="ru-RU" sz="1600" dirty="0"/>
+                        <a:t>Требование</a:t>
+                      </a:r>
+                      <a:r>
+                        <a:rPr lang="en-US" sz="1600" dirty="0"/>
+                        <a:t>: </a:t>
+                      </a:r>
+                      <a:r>
+                        <a:rPr lang="ru-RU" sz="1600" dirty="0"/>
+                        <a:t>Любые с ролью </a:t>
+                      </a:r>
+                      <a:r>
+                        <a:rPr lang="en-US" sz="1600" dirty="0"/>
+                        <a:t>Writer</a:t>
                       </a:r>
                     </a:p>
                     <a:p>
                       <a:pPr lvl="1" algn="l"/>
                       <a:r>
+                        <a:rPr lang="ru-RU" sz="1600" i="1" dirty="0"/>
+                        <a:t>Путь</a:t>
+                      </a:r>
+                      <a:r>
                         <a:rPr lang="en-US" sz="1600" i="1" dirty="0"/>
-                        <a:t>Path: Channel/Application/Writers</a:t>
+                        <a:t>: Channel/Application/Writers</a:t>
                       </a:r>
                     </a:p>
                   </a:txBody>
@@ -4462,22 +4515,42 @@
                     <a:p>
                       <a:pPr lvl="1"/>
                       <a:r>
-                        <a:rPr lang="en-US" sz="1600" dirty="0"/>
-                        <a:t>Policy Type: Implicit Meta</a:t>
+                        <a:rPr lang="ru-RU" sz="1600" dirty="0"/>
+                        <a:t>Тип правил</a:t>
+                      </a:r>
+                      <a:r>
+                        <a:rPr lang="en-US" sz="1600" dirty="0"/>
+                        <a:t>: Implicit Meta</a:t>
                       </a:r>
                     </a:p>
                     <a:p>
                       <a:pPr lvl="1"/>
                       <a:r>
-                        <a:rPr lang="en-US" sz="1600" dirty="0"/>
-                        <a:t>Rule: Any Readers</a:t>
+                        <a:rPr lang="ru-RU" sz="1600" dirty="0"/>
+                        <a:t>Требование</a:t>
+                      </a:r>
+                      <a:r>
+                        <a:rPr lang="en-US" sz="1600" dirty="0"/>
+                        <a:t>: </a:t>
+                      </a:r>
+                      <a:r>
+                        <a:rPr lang="ru-RU" sz="1600" dirty="0"/>
+                        <a:t>Любые с ролью </a:t>
+                      </a:r>
+                      <a:r>
+                        <a:rPr lang="en-US" sz="1600" dirty="0"/>
+                        <a:t>Reader</a:t>
                       </a:r>
                     </a:p>
                     <a:p>
                       <a:pPr lvl="1" algn="l"/>
                       <a:r>
+                        <a:rPr lang="ru-RU" sz="1600" i="1" dirty="0"/>
+                        <a:t>Путь</a:t>
+                      </a:r>
+                      <a:r>
                         <a:rPr lang="en-US" sz="1600" i="1" dirty="0"/>
-                        <a:t>Path: Channel/Application/Readers</a:t>
+                        <a:t>: Channel/Application/Readers</a:t>
                       </a:r>
                     </a:p>
                   </a:txBody>
@@ -4541,22 +4614,42 @@
                     <a:p>
                       <a:pPr lvl="1"/>
                       <a:r>
-                        <a:rPr lang="en-US" sz="1600" dirty="0"/>
-                        <a:t>Policy Type: Implicit Meta</a:t>
+                        <a:rPr lang="ru-RU" sz="1600" dirty="0"/>
+                        <a:t>Тип правил</a:t>
+                      </a:r>
+                      <a:r>
+                        <a:rPr lang="en-US" sz="1600" dirty="0"/>
+                        <a:t>: Implicit Meta</a:t>
                       </a:r>
                     </a:p>
                     <a:p>
                       <a:pPr lvl="1"/>
                       <a:r>
-                        <a:rPr lang="en-US" sz="1600" dirty="0"/>
-                        <a:t>Rule: Any Readers</a:t>
+                        <a:rPr lang="ru-RU" sz="1600" dirty="0"/>
+                        <a:t>Требование</a:t>
+                      </a:r>
+                      <a:r>
+                        <a:rPr lang="en-US" sz="1600" dirty="0"/>
+                        <a:t>: </a:t>
+                      </a:r>
+                      <a:r>
+                        <a:rPr lang="ru-RU" sz="1600" dirty="0"/>
+                        <a:t>Любые с ролью </a:t>
+                      </a:r>
+                      <a:r>
+                        <a:rPr lang="en-US" sz="1600" dirty="0"/>
+                        <a:t>Reader</a:t>
                       </a:r>
                     </a:p>
                     <a:p>
                       <a:pPr lvl="1" algn="l"/>
                       <a:r>
+                        <a:rPr lang="ru-RU" sz="1600" i="1" dirty="0"/>
+                        <a:t>Путь</a:t>
+                      </a:r>
+                      <a:r>
                         <a:rPr lang="en-US" sz="1600" i="1" dirty="0"/>
-                        <a:t>Path: Channel/Application/</a:t>
+                        <a:t>: Channel/Application/</a:t>
                       </a:r>
                       <a:r>
                         <a:rPr lang="en-US" sz="1600" dirty="0" err="1"/>
@@ -4624,22 +4717,42 @@
                     <a:p>
                       <a:pPr lvl="1"/>
                       <a:r>
-                        <a:rPr lang="en-US" sz="1600" dirty="0"/>
-                        <a:t>Policy Type: Implicit Meta</a:t>
+                        <a:rPr lang="ru-RU" sz="1600" dirty="0"/>
+                        <a:t>Тип правил</a:t>
+                      </a:r>
+                      <a:r>
+                        <a:rPr lang="en-US" sz="1600" dirty="0"/>
+                        <a:t>: Implicit Meta</a:t>
                       </a:r>
                     </a:p>
                     <a:p>
                       <a:pPr lvl="1"/>
                       <a:r>
-                        <a:rPr lang="en-US" sz="1600" dirty="0"/>
-                        <a:t>Rule: Any Endorsement</a:t>
+                        <a:rPr lang="ru-RU" sz="1600" dirty="0"/>
+                        <a:t>Требование</a:t>
+                      </a:r>
+                      <a:r>
+                        <a:rPr lang="en-US" sz="1600" dirty="0"/>
+                        <a:t>: </a:t>
+                      </a:r>
+                      <a:r>
+                        <a:rPr lang="ru-RU" sz="1600" dirty="0"/>
+                        <a:t>Любые с ролью </a:t>
+                      </a:r>
+                      <a:r>
+                        <a:rPr lang="en-US" sz="1600" dirty="0"/>
+                        <a:t>Endorsement</a:t>
                       </a:r>
                     </a:p>
                     <a:p>
                       <a:pPr lvl="1" algn="l"/>
                       <a:r>
+                        <a:rPr lang="ru-RU" sz="1600" i="1" dirty="0"/>
+                        <a:t>Путь</a:t>
+                      </a:r>
+                      <a:r>
                         <a:rPr lang="en-US" sz="1600" i="1" dirty="0"/>
-                        <a:t>Path: Channel/Application/Endorsement</a:t>
+                        <a:t>: Channel/Application/Endorsement</a:t>
                       </a:r>
                     </a:p>
                   </a:txBody>
@@ -4707,7 +4820,7 @@
           <p:nvPr>
             <p:extLst>
               <p:ext uri="{D42A27DB-BD31-4B8C-83A1-F6EECF244321}">
-                <p14:modId xmlns:p14="http://schemas.microsoft.com/office/powerpoint/2010/main" val="440992039"/>
+                <p14:modId xmlns:p14="http://schemas.microsoft.com/office/powerpoint/2010/main" val="3815567420"/>
               </p:ext>
             </p:extLst>
           </p:nvPr>
@@ -4739,8 +4852,8 @@
                     <a:p>
                       <a:pPr algn="ctr"/>
                       <a:r>
-                        <a:rPr lang="en-US" dirty="0"/>
-                        <a:t>Peer Organizations</a:t>
+                        <a:rPr lang="ru-RU" dirty="0"/>
+                        <a:t>Организации-члены канала</a:t>
                       </a:r>
                       <a:endParaRPr lang="en-US" i="1" dirty="0"/>
                     </a:p>
@@ -4803,8 +4916,12 @@
                     </a:p>
                     <a:p>
                       <a:r>
-                        <a:rPr lang="en-US" sz="1600" dirty="0"/>
-                        <a:t>Signature Policies:</a:t>
+                        <a:rPr lang="ru-RU" sz="1600" dirty="0"/>
+                        <a:t>Правила подписи</a:t>
+                      </a:r>
+                      <a:r>
+                        <a:rPr lang="en-US" sz="1600" dirty="0"/>
+                        <a:t>:</a:t>
                       </a:r>
                     </a:p>
                     <a:p>
@@ -4894,8 +5011,12 @@
                     </a:p>
                     <a:p>
                       <a:r>
-                        <a:rPr lang="en-US" sz="1600" dirty="0"/>
-                        <a:t>Signature Policies:</a:t>
+                        <a:rPr lang="ru-RU" sz="1600" dirty="0"/>
+                        <a:t>Правила подписи</a:t>
+                      </a:r>
+                      <a:r>
+                        <a:rPr lang="en-US" sz="1600" dirty="0"/>
+                        <a:t>:</a:t>
                       </a:r>
                     </a:p>
                     <a:p>
@@ -4988,8 +5109,12 @@
                     </a:p>
                     <a:p>
                       <a:r>
-                        <a:rPr lang="en-US" sz="1600" dirty="0"/>
-                        <a:t>Signature Policies:</a:t>
+                        <a:rPr lang="ru-RU" sz="1600" dirty="0"/>
+                        <a:t>Правила подписи</a:t>
+                      </a:r>
+                      <a:r>
+                        <a:rPr lang="en-US" sz="1600" dirty="0"/>
+                        <a:t>:</a:t>
                       </a:r>
                     </a:p>
                     <a:p>
@@ -5089,8 +5214,8 @@
         </p:nvCxnSpPr>
         <p:spPr>
           <a:xfrm>
-            <a:off x="3286903" y="1705232"/>
-            <a:ext cx="1655807" cy="0"/>
+            <a:off x="4483865" y="1705232"/>
+            <a:ext cx="458845" cy="0"/>
           </a:xfrm>
           <a:prstGeom prst="line">
             <a:avLst/>
@@ -5352,7 +5477,7 @@
             <p:ph idx="1"/>
             <p:extLst>
               <p:ext uri="{D42A27DB-BD31-4B8C-83A1-F6EECF244321}">
-                <p14:modId xmlns:p14="http://schemas.microsoft.com/office/powerpoint/2010/main" val="886776569"/>
+                <p14:modId xmlns:p14="http://schemas.microsoft.com/office/powerpoint/2010/main" val="3992480959"/>
               </p:ext>
             </p:extLst>
           </p:nvPr>
@@ -5384,15 +5509,20 @@
                     <a:p>
                       <a:pPr algn="ctr"/>
                       <a:r>
-                        <a:rPr lang="en-US" dirty="0"/>
-                        <a:t>Application policies</a:t>
-                      </a:r>
+                        <a:rPr lang="ru-RU" dirty="0"/>
+                        <a:t>Правила приложения</a:t>
+                      </a:r>
+                      <a:endParaRPr lang="en-US" dirty="0"/>
                     </a:p>
                     <a:p>
                       <a:pPr algn="ctr"/>
                       <a:r>
+                        <a:rPr lang="ru-RU" i="1" dirty="0"/>
+                        <a:t>Путь к правилам</a:t>
+                      </a:r>
+                      <a:r>
                         <a:rPr lang="en-US" i="1" dirty="0"/>
-                        <a:t>Policy path: Channel/Application</a:t>
+                        <a:t>: Channel/Application</a:t>
                       </a:r>
                     </a:p>
                   </a:txBody>
@@ -5455,22 +5585,42 @@
                     <a:p>
                       <a:pPr lvl="1"/>
                       <a:r>
-                        <a:rPr lang="en-US" sz="1600" dirty="0"/>
-                        <a:t>Policy Type: Implicit Meta</a:t>
+                        <a:rPr lang="ru-RU" sz="1600" dirty="0"/>
+                        <a:t>Тип правил</a:t>
+                      </a:r>
+                      <a:r>
+                        <a:rPr lang="en-US" sz="1600" dirty="0"/>
+                        <a:t>: Implicit Meta</a:t>
                       </a:r>
                     </a:p>
                     <a:p>
                       <a:pPr lvl="1"/>
                       <a:r>
-                        <a:rPr lang="en-US" sz="1600" dirty="0"/>
-                        <a:t>Rule: Majority Admins</a:t>
+                        <a:rPr lang="ru-RU" sz="1600" dirty="0"/>
+                        <a:t>Требование</a:t>
+                      </a:r>
+                      <a:r>
+                        <a:rPr lang="en-US" sz="1600" dirty="0"/>
+                        <a:t>: </a:t>
+                      </a:r>
+                      <a:r>
+                        <a:rPr lang="ru-RU" sz="1600" dirty="0"/>
+                        <a:t>Большинство с ролью</a:t>
+                      </a:r>
+                      <a:r>
+                        <a:rPr lang="en-US" sz="1600" dirty="0"/>
+                        <a:t> Admin</a:t>
                       </a:r>
                     </a:p>
                     <a:p>
                       <a:pPr lvl="1" algn="l"/>
                       <a:r>
+                        <a:rPr lang="ru-RU" sz="1600" i="1" dirty="0"/>
+                        <a:t>Путь</a:t>
+                      </a:r>
+                      <a:r>
                         <a:rPr lang="en-US" sz="1600" i="1" dirty="0"/>
-                        <a:t>Path: Channel/Application/Admins</a:t>
+                        <a:t>: Channel/Application/Admins</a:t>
                       </a:r>
                     </a:p>
                   </a:txBody>
@@ -5537,34 +5687,74 @@
                     <a:p>
                       <a:pPr lvl="1"/>
                       <a:r>
+                        <a:rPr lang="ru-RU" sz="1600" dirty="0">
+                          <a:solidFill>
+                            <a:schemeClr val="accent3"/>
+                          </a:solidFill>
+                        </a:rPr>
+                        <a:t>Тип правил</a:t>
+                      </a:r>
+                      <a:r>
                         <a:rPr lang="en-US" sz="1600" dirty="0">
                           <a:solidFill>
                             <a:schemeClr val="accent3"/>
                           </a:solidFill>
                         </a:rPr>
-                        <a:t>Policy Type: Implicit Meta</a:t>
+                        <a:t>: Implicit Meta</a:t>
                       </a:r>
                     </a:p>
                     <a:p>
                       <a:pPr lvl="1"/>
                       <a:r>
+                        <a:rPr lang="ru-RU" sz="1600" dirty="0">
+                          <a:solidFill>
+                            <a:schemeClr val="accent3"/>
+                          </a:solidFill>
+                        </a:rPr>
+                        <a:t>Требование</a:t>
+                      </a:r>
+                      <a:r>
                         <a:rPr lang="en-US" sz="1600" dirty="0">
                           <a:solidFill>
                             <a:schemeClr val="accent3"/>
                           </a:solidFill>
                         </a:rPr>
-                        <a:t>Rule: Any Writers</a:t>
+                        <a:t>: </a:t>
+                      </a:r>
+                      <a:r>
+                        <a:rPr lang="ru-RU" sz="1600" dirty="0">
+                          <a:solidFill>
+                            <a:schemeClr val="accent3"/>
+                          </a:solidFill>
+                        </a:rPr>
+                        <a:t>Любые с ролью</a:t>
+                      </a:r>
+                      <a:r>
+                        <a:rPr lang="en-US" sz="1600" dirty="0">
+                          <a:solidFill>
+                            <a:schemeClr val="accent3"/>
+                          </a:solidFill>
+                        </a:rPr>
+                        <a:t> Writer</a:t>
                       </a:r>
                     </a:p>
                     <a:p>
                       <a:pPr lvl="1" algn="l"/>
                       <a:r>
+                        <a:rPr lang="ru-RU" sz="1600" i="1" dirty="0">
+                          <a:solidFill>
+                            <a:schemeClr val="accent3"/>
+                          </a:solidFill>
+                        </a:rPr>
+                        <a:t>Путь</a:t>
+                      </a:r>
+                      <a:r>
                         <a:rPr lang="en-US" sz="1600" i="1" dirty="0">
                           <a:solidFill>
                             <a:schemeClr val="accent3"/>
                           </a:solidFill>
                         </a:rPr>
-                        <a:t>Path: Channel/Application/Writers</a:t>
+                        <a:t>: Channel/Application/Writers</a:t>
                       </a:r>
                     </a:p>
                   </a:txBody>
@@ -5631,34 +5821,74 @@
                     <a:p>
                       <a:pPr lvl="1"/>
                       <a:r>
+                        <a:rPr lang="ru-RU" sz="1600" dirty="0">
+                          <a:solidFill>
+                            <a:schemeClr val="accent3"/>
+                          </a:solidFill>
+                        </a:rPr>
+                        <a:t>Тип правил</a:t>
+                      </a:r>
+                      <a:r>
                         <a:rPr lang="en-US" sz="1600" dirty="0">
                           <a:solidFill>
                             <a:schemeClr val="accent3"/>
                           </a:solidFill>
                         </a:rPr>
-                        <a:t>Policy Type: Implicit Meta</a:t>
+                        <a:t>: Implicit Meta</a:t>
                       </a:r>
                     </a:p>
                     <a:p>
                       <a:pPr lvl="1"/>
                       <a:r>
+                        <a:rPr lang="ru-RU" sz="1600" dirty="0">
+                          <a:solidFill>
+                            <a:schemeClr val="accent3"/>
+                          </a:solidFill>
+                        </a:rPr>
+                        <a:t>Требование</a:t>
+                      </a:r>
+                      <a:r>
                         <a:rPr lang="en-US" sz="1600" dirty="0">
                           <a:solidFill>
                             <a:schemeClr val="accent3"/>
                           </a:solidFill>
                         </a:rPr>
-                        <a:t>Rule: Any Readers</a:t>
+                        <a:t>: </a:t>
+                      </a:r>
+                      <a:r>
+                        <a:rPr lang="ru-RU" sz="1600" dirty="0">
+                          <a:solidFill>
+                            <a:schemeClr val="accent3"/>
+                          </a:solidFill>
+                        </a:rPr>
+                        <a:t>Любые с ролью</a:t>
+                      </a:r>
+                      <a:r>
+                        <a:rPr lang="en-US" sz="1600" dirty="0">
+                          <a:solidFill>
+                            <a:schemeClr val="accent3"/>
+                          </a:solidFill>
+                        </a:rPr>
+                        <a:t> Reader</a:t>
                       </a:r>
                     </a:p>
                     <a:p>
                       <a:pPr lvl="1" algn="l"/>
                       <a:r>
+                        <a:rPr lang="ru-RU" sz="1600" i="1" dirty="0">
+                          <a:solidFill>
+                            <a:schemeClr val="accent3"/>
+                          </a:solidFill>
+                        </a:rPr>
+                        <a:t>Путь</a:t>
+                      </a:r>
+                      <a:r>
                         <a:rPr lang="en-US" sz="1600" i="1" dirty="0">
                           <a:solidFill>
                             <a:schemeClr val="accent3"/>
                           </a:solidFill>
                         </a:rPr>
-                        <a:t>Path: Channel/Application/Readers</a:t>
+                        <a:t>: Channel/Application/Readers</a:t>
                       </a:r>
                     </a:p>
                   </a:txBody>
@@ -5730,34 +5960,74 @@
                     <a:p>
                       <a:pPr lvl="1"/>
                       <a:r>
+                        <a:rPr lang="ru-RU" sz="1600" dirty="0">
+                          <a:solidFill>
+                            <a:schemeClr val="accent3"/>
+                          </a:solidFill>
+                        </a:rPr>
+                        <a:t>Тип правил</a:t>
+                      </a:r>
+                      <a:r>
                         <a:rPr lang="en-US" sz="1600" dirty="0">
                           <a:solidFill>
                             <a:schemeClr val="accent3"/>
                           </a:solidFill>
                         </a:rPr>
-                        <a:t>Policy Type: Implicit Meta</a:t>
+                        <a:t>: Implicit Meta</a:t>
                       </a:r>
                     </a:p>
                     <a:p>
                       <a:pPr lvl="1"/>
                       <a:r>
+                        <a:rPr lang="ru-RU" sz="1600" dirty="0">
+                          <a:solidFill>
+                            <a:schemeClr val="accent3"/>
+                          </a:solidFill>
+                        </a:rPr>
+                        <a:t>Требование</a:t>
+                      </a:r>
+                      <a:r>
                         <a:rPr lang="en-US" sz="1600" dirty="0">
                           <a:solidFill>
                             <a:schemeClr val="accent3"/>
                           </a:solidFill>
                         </a:rPr>
-                        <a:t>Rule: Any Readers</a:t>
+                        <a:t>: </a:t>
+                      </a:r>
+                      <a:r>
+                        <a:rPr lang="ru-RU" sz="1600" dirty="0">
+                          <a:solidFill>
+                            <a:schemeClr val="accent3"/>
+                          </a:solidFill>
+                        </a:rPr>
+                        <a:t>Любые с ролью</a:t>
+                      </a:r>
+                      <a:r>
+                        <a:rPr lang="en-US" sz="1600" dirty="0">
+                          <a:solidFill>
+                            <a:schemeClr val="accent3"/>
+                          </a:solidFill>
+                        </a:rPr>
+                        <a:t> Reader</a:t>
                       </a:r>
                     </a:p>
                     <a:p>
                       <a:pPr lvl="1" algn="l"/>
                       <a:r>
+                        <a:rPr lang="ru-RU" sz="1600" i="1" dirty="0">
+                          <a:solidFill>
+                            <a:schemeClr val="accent3"/>
+                          </a:solidFill>
+                        </a:rPr>
+                        <a:t>Путь</a:t>
+                      </a:r>
+                      <a:r>
                         <a:rPr lang="en-US" sz="1600" i="1" dirty="0">
                           <a:solidFill>
                             <a:schemeClr val="accent3"/>
                           </a:solidFill>
                         </a:rPr>
-                        <a:t>Path: Channel/Application/</a:t>
+                        <a:t>: Channel/Application/</a:t>
                       </a:r>
                       <a:r>
                         <a:rPr lang="en-US" sz="1600" dirty="0" err="1">
@@ -5837,34 +6107,74 @@
                     <a:p>
                       <a:pPr lvl="1"/>
                       <a:r>
+                        <a:rPr lang="ru-RU" sz="1600" dirty="0">
+                          <a:solidFill>
+                            <a:schemeClr val="accent3"/>
+                          </a:solidFill>
+                        </a:rPr>
+                        <a:t>Тип правил</a:t>
+                      </a:r>
+                      <a:r>
                         <a:rPr lang="en-US" sz="1600" dirty="0">
                           <a:solidFill>
                             <a:schemeClr val="accent3"/>
                           </a:solidFill>
                         </a:rPr>
-                        <a:t>Policy Type: Implicit Meta</a:t>
+                        <a:t>: Implicit Meta</a:t>
                       </a:r>
                     </a:p>
                     <a:p>
                       <a:pPr lvl="1"/>
                       <a:r>
+                        <a:rPr lang="ru-RU" sz="1600" dirty="0">
+                          <a:solidFill>
+                            <a:schemeClr val="accent3"/>
+                          </a:solidFill>
+                        </a:rPr>
+                        <a:t>Требование</a:t>
+                      </a:r>
+                      <a:r>
                         <a:rPr lang="en-US" sz="1600" dirty="0">
                           <a:solidFill>
                             <a:schemeClr val="accent3"/>
                           </a:solidFill>
                         </a:rPr>
-                        <a:t>Rule: Any Endorsement</a:t>
+                        <a:t>: </a:t>
+                      </a:r>
+                      <a:r>
+                        <a:rPr lang="ru-RU" sz="1600" dirty="0">
+                          <a:solidFill>
+                            <a:schemeClr val="accent3"/>
+                          </a:solidFill>
+                        </a:rPr>
+                        <a:t>Любые с ролью</a:t>
+                      </a:r>
+                      <a:r>
+                        <a:rPr lang="en-US" sz="1600" dirty="0">
+                          <a:solidFill>
+                            <a:schemeClr val="accent3"/>
+                          </a:solidFill>
+                        </a:rPr>
+                        <a:t> Endorsement</a:t>
                       </a:r>
                     </a:p>
                     <a:p>
                       <a:pPr lvl="1" algn="l"/>
                       <a:r>
+                        <a:rPr lang="ru-RU" sz="1600" i="1" dirty="0">
+                          <a:solidFill>
+                            <a:schemeClr val="accent3"/>
+                          </a:solidFill>
+                        </a:rPr>
+                        <a:t>Путь</a:t>
+                      </a:r>
+                      <a:r>
                         <a:rPr lang="en-US" sz="1600" i="1" dirty="0">
                           <a:solidFill>
                             <a:schemeClr val="accent3"/>
                           </a:solidFill>
                         </a:rPr>
-                        <a:t>Path: Channel/Application/Endorsement</a:t>
+                        <a:t>: Channel/Application/Endorsement</a:t>
                       </a:r>
                     </a:p>
                   </a:txBody>
@@ -5932,7 +6242,7 @@
           <p:nvPr>
             <p:extLst>
               <p:ext uri="{D42A27DB-BD31-4B8C-83A1-F6EECF244321}">
-                <p14:modId xmlns:p14="http://schemas.microsoft.com/office/powerpoint/2010/main" val="3176431530"/>
+                <p14:modId xmlns:p14="http://schemas.microsoft.com/office/powerpoint/2010/main" val="3801189530"/>
               </p:ext>
             </p:extLst>
           </p:nvPr>
@@ -5964,8 +6274,8 @@
                     <a:p>
                       <a:pPr algn="ctr"/>
                       <a:r>
-                        <a:rPr lang="en-US" dirty="0"/>
-                        <a:t>Peer Organizations</a:t>
+                        <a:rPr lang="ru-RU" dirty="0"/>
+                        <a:t>Организации-члены канала</a:t>
                       </a:r>
                       <a:endParaRPr lang="en-US" i="1" dirty="0"/>
                     </a:p>
@@ -6028,8 +6338,12 @@
                     </a:p>
                     <a:p>
                       <a:r>
-                        <a:rPr lang="en-US" sz="1600" dirty="0"/>
-                        <a:t>Signature Policies:</a:t>
+                        <a:rPr lang="ru-RU" sz="1600" dirty="0"/>
+                        <a:t>Правила подписи</a:t>
+                      </a:r>
+                      <a:r>
+                        <a:rPr lang="en-US" sz="1600" dirty="0"/>
+                        <a:t>:</a:t>
                       </a:r>
                     </a:p>
                     <a:p>
@@ -6131,8 +6445,12 @@
                     </a:p>
                     <a:p>
                       <a:r>
-                        <a:rPr lang="en-US" sz="1600" dirty="0"/>
-                        <a:t>Signature Policies:</a:t>
+                        <a:rPr lang="ru-RU" sz="1600" dirty="0"/>
+                        <a:t>Правила подписи</a:t>
+                      </a:r>
+                      <a:r>
+                        <a:rPr lang="en-US" sz="1600" dirty="0"/>
+                        <a:t>:</a:t>
                       </a:r>
                     </a:p>
                     <a:p>
@@ -6237,8 +6555,12 @@
                     </a:p>
                     <a:p>
                       <a:r>
-                        <a:rPr lang="en-US" sz="1600" dirty="0"/>
-                        <a:t>Signature Policies:</a:t>
+                        <a:rPr lang="ru-RU" sz="1600" dirty="0"/>
+                        <a:t>Правила подписи</a:t>
+                      </a:r>
+                      <a:r>
+                        <a:rPr lang="en-US" sz="1600" dirty="0"/>
+                        <a:t>:</a:t>
                       </a:r>
                     </a:p>
                     <a:p>
@@ -6470,7 +6792,7 @@
         </p:blipFill>
         <p:spPr>
           <a:xfrm>
-            <a:off x="4423867" y="1408571"/>
+            <a:off x="4534037" y="1408571"/>
             <a:ext cx="562428" cy="562428"/>
           </a:xfrm>
           <a:prstGeom prst="rect">
@@ -6524,7 +6846,7 @@
             <p:ph idx="1"/>
             <p:extLst>
               <p:ext uri="{D42A27DB-BD31-4B8C-83A1-F6EECF244321}">
-                <p14:modId xmlns:p14="http://schemas.microsoft.com/office/powerpoint/2010/main" val="1780878558"/>
+                <p14:modId xmlns:p14="http://schemas.microsoft.com/office/powerpoint/2010/main" val="38715063"/>
               </p:ext>
             </p:extLst>
           </p:nvPr>
@@ -6556,15 +6878,20 @@
                     <a:p>
                       <a:pPr algn="ctr"/>
                       <a:r>
-                        <a:rPr lang="en-US" dirty="0"/>
-                        <a:t>Application policies</a:t>
-                      </a:r>
+                        <a:rPr lang="ru-RU" dirty="0"/>
+                        <a:t>Правила приложения</a:t>
+                      </a:r>
+                      <a:endParaRPr lang="en-US" dirty="0"/>
                     </a:p>
                     <a:p>
                       <a:pPr algn="ctr"/>
                       <a:r>
+                        <a:rPr lang="ru-RU" i="1" dirty="0"/>
+                        <a:t>Путь к правилам</a:t>
+                      </a:r>
+                      <a:r>
                         <a:rPr lang="en-US" i="1" dirty="0"/>
-                        <a:t>Policy path: Channel/Application</a:t>
+                        <a:t>: Channel/Application</a:t>
                       </a:r>
                     </a:p>
                   </a:txBody>
@@ -6631,34 +6958,74 @@
                     <a:p>
                       <a:pPr lvl="1"/>
                       <a:r>
+                        <a:rPr lang="ru-RU" sz="1600" dirty="0">
+                          <a:solidFill>
+                            <a:schemeClr val="accent3"/>
+                          </a:solidFill>
+                        </a:rPr>
+                        <a:t>Тип правил</a:t>
+                      </a:r>
+                      <a:r>
                         <a:rPr lang="en-US" sz="1600" dirty="0">
                           <a:solidFill>
                             <a:schemeClr val="accent3"/>
                           </a:solidFill>
                         </a:rPr>
-                        <a:t>Policy Type: Implicit Meta</a:t>
+                        <a:t>: Implicit Meta</a:t>
                       </a:r>
                     </a:p>
                     <a:p>
                       <a:pPr lvl="1"/>
                       <a:r>
+                        <a:rPr lang="ru-RU" sz="1600" dirty="0">
+                          <a:solidFill>
+                            <a:schemeClr val="accent3"/>
+                          </a:solidFill>
+                        </a:rPr>
+                        <a:t>Требование</a:t>
+                      </a:r>
+                      <a:r>
                         <a:rPr lang="en-US" sz="1600" dirty="0">
                           <a:solidFill>
                             <a:schemeClr val="accent3"/>
                           </a:solidFill>
                         </a:rPr>
-                        <a:t>Rule: Majority Admins</a:t>
+                        <a:t>: </a:t>
+                      </a:r>
+                      <a:r>
+                        <a:rPr lang="ru-RU" sz="1600" dirty="0">
+                          <a:solidFill>
+                            <a:schemeClr val="accent3"/>
+                          </a:solidFill>
+                        </a:rPr>
+                        <a:t>Большинство с ролью</a:t>
+                      </a:r>
+                      <a:r>
+                        <a:rPr lang="en-US" sz="1600" dirty="0">
+                          <a:solidFill>
+                            <a:schemeClr val="accent3"/>
+                          </a:solidFill>
+                        </a:rPr>
+                        <a:t> Admin</a:t>
                       </a:r>
                     </a:p>
                     <a:p>
                       <a:pPr lvl="1" algn="l"/>
                       <a:r>
+                        <a:rPr lang="ru-RU" sz="1600" i="1" dirty="0">
+                          <a:solidFill>
+                            <a:schemeClr val="accent3"/>
+                          </a:solidFill>
+                        </a:rPr>
+                        <a:t>Путь</a:t>
+                      </a:r>
+                      <a:r>
                         <a:rPr lang="en-US" sz="1600" i="1" dirty="0">
                           <a:solidFill>
                             <a:schemeClr val="accent3"/>
                           </a:solidFill>
                         </a:rPr>
-                        <a:t>Path: Channel/Application/Admins</a:t>
+                        <a:t>: Channel/Application/Admins</a:t>
                       </a:r>
                     </a:p>
                   </a:txBody>
@@ -6725,34 +7092,74 @@
                     <a:p>
                       <a:pPr lvl="1"/>
                       <a:r>
+                        <a:rPr lang="ru-RU" sz="1600" dirty="0">
+                          <a:solidFill>
+                            <a:schemeClr val="accent3"/>
+                          </a:solidFill>
+                        </a:rPr>
+                        <a:t>Тип правил</a:t>
+                      </a:r>
+                      <a:r>
                         <a:rPr lang="en-US" sz="1600" dirty="0">
                           <a:solidFill>
                             <a:schemeClr val="accent3"/>
                           </a:solidFill>
                         </a:rPr>
-                        <a:t>Policy Type: Implicit Meta</a:t>
+                        <a:t>: Implicit Meta</a:t>
                       </a:r>
                     </a:p>
                     <a:p>
                       <a:pPr lvl="1"/>
                       <a:r>
+                        <a:rPr lang="ru-RU" sz="1600" dirty="0">
+                          <a:solidFill>
+                            <a:schemeClr val="accent3"/>
+                          </a:solidFill>
+                        </a:rPr>
+                        <a:t>Требование</a:t>
+                      </a:r>
+                      <a:r>
                         <a:rPr lang="en-US" sz="1600" dirty="0">
                           <a:solidFill>
                             <a:schemeClr val="accent3"/>
                           </a:solidFill>
                         </a:rPr>
-                        <a:t>Rule: Any Writers</a:t>
+                        <a:t>:</a:t>
+                      </a:r>
+                      <a:r>
+                        <a:rPr lang="ru-RU" sz="1600" dirty="0">
+                          <a:solidFill>
+                            <a:schemeClr val="accent3"/>
+                          </a:solidFill>
+                        </a:rPr>
+                        <a:t> Любые с ролью</a:t>
+                      </a:r>
+                      <a:r>
+                        <a:rPr lang="en-US" sz="1600" dirty="0">
+                          <a:solidFill>
+                            <a:schemeClr val="accent3"/>
+                          </a:solidFill>
+                        </a:rPr>
+                        <a:t> Writer</a:t>
                       </a:r>
                     </a:p>
                     <a:p>
                       <a:pPr lvl="1" algn="l"/>
                       <a:r>
+                        <a:rPr lang="ru-RU" sz="1600" i="1" dirty="0">
+                          <a:solidFill>
+                            <a:schemeClr val="accent3"/>
+                          </a:solidFill>
+                        </a:rPr>
+                        <a:t>Путь</a:t>
+                      </a:r>
+                      <a:r>
                         <a:rPr lang="en-US" sz="1600" i="1" dirty="0">
                           <a:solidFill>
                             <a:schemeClr val="accent3"/>
                           </a:solidFill>
                         </a:rPr>
-                        <a:t>Path: Channel/Application/Writers</a:t>
+                        <a:t>: Channel/Application/Writers</a:t>
                       </a:r>
                     </a:p>
                   </a:txBody>
@@ -6819,34 +7226,74 @@
                     <a:p>
                       <a:pPr lvl="1"/>
                       <a:r>
+                        <a:rPr lang="ru-RU" sz="1600" dirty="0">
+                          <a:solidFill>
+                            <a:schemeClr val="accent3"/>
+                          </a:solidFill>
+                        </a:rPr>
+                        <a:t>Тип правил</a:t>
+                      </a:r>
+                      <a:r>
                         <a:rPr lang="en-US" sz="1600" dirty="0">
                           <a:solidFill>
                             <a:schemeClr val="accent3"/>
                           </a:solidFill>
                         </a:rPr>
-                        <a:t>Policy Type: Implicit Meta</a:t>
+                        <a:t>: Implicit Meta</a:t>
                       </a:r>
                     </a:p>
                     <a:p>
                       <a:pPr lvl="1"/>
                       <a:r>
+                        <a:rPr lang="ru-RU" sz="1600" dirty="0">
+                          <a:solidFill>
+                            <a:schemeClr val="accent3"/>
+                          </a:solidFill>
+                        </a:rPr>
+                        <a:t>Требование</a:t>
+                      </a:r>
+                      <a:r>
                         <a:rPr lang="en-US" sz="1600" dirty="0">
                           <a:solidFill>
                             <a:schemeClr val="accent3"/>
                           </a:solidFill>
                         </a:rPr>
-                        <a:t>Rule: Any Readers</a:t>
+                        <a:t>: </a:t>
+                      </a:r>
+                      <a:r>
+                        <a:rPr lang="ru-RU" sz="1600" dirty="0">
+                          <a:solidFill>
+                            <a:schemeClr val="accent3"/>
+                          </a:solidFill>
+                        </a:rPr>
+                        <a:t>Любые с ролью</a:t>
+                      </a:r>
+                      <a:r>
+                        <a:rPr lang="en-US" sz="1600" dirty="0">
+                          <a:solidFill>
+                            <a:schemeClr val="accent3"/>
+                          </a:solidFill>
+                        </a:rPr>
+                        <a:t> Reader</a:t>
                       </a:r>
                     </a:p>
                     <a:p>
                       <a:pPr lvl="1" algn="l"/>
                       <a:r>
+                        <a:rPr lang="ru-RU" sz="1600" i="1" dirty="0">
+                          <a:solidFill>
+                            <a:schemeClr val="accent3"/>
+                          </a:solidFill>
+                        </a:rPr>
+                        <a:t>Путь</a:t>
+                      </a:r>
+                      <a:r>
                         <a:rPr lang="en-US" sz="1600" i="1" dirty="0">
                           <a:solidFill>
                             <a:schemeClr val="accent3"/>
                           </a:solidFill>
                         </a:rPr>
-                        <a:t>Path: Channel/Application/Readers</a:t>
+                        <a:t>: Channel/Application/Readers</a:t>
                       </a:r>
                     </a:p>
                   </a:txBody>
@@ -6918,34 +7365,74 @@
                     <a:p>
                       <a:pPr lvl="1"/>
                       <a:r>
+                        <a:rPr lang="ru-RU" sz="1600" dirty="0">
+                          <a:solidFill>
+                            <a:schemeClr val="accent3"/>
+                          </a:solidFill>
+                        </a:rPr>
+                        <a:t>Тип правил</a:t>
+                      </a:r>
+                      <a:r>
                         <a:rPr lang="en-US" sz="1600" dirty="0">
                           <a:solidFill>
                             <a:schemeClr val="accent3"/>
                           </a:solidFill>
                         </a:rPr>
-                        <a:t>Policy Type: Implicit Meta</a:t>
+                        <a:t>: Implicit Meta</a:t>
                       </a:r>
                     </a:p>
                     <a:p>
                       <a:pPr lvl="1"/>
                       <a:r>
+                        <a:rPr lang="ru-RU" sz="1600" dirty="0">
+                          <a:solidFill>
+                            <a:schemeClr val="accent3"/>
+                          </a:solidFill>
+                        </a:rPr>
+                        <a:t>Требование</a:t>
+                      </a:r>
+                      <a:r>
                         <a:rPr lang="en-US" sz="1600" dirty="0">
                           <a:solidFill>
                             <a:schemeClr val="accent3"/>
                           </a:solidFill>
                         </a:rPr>
-                        <a:t>Rule: Any Readers</a:t>
+                        <a:t>: </a:t>
+                      </a:r>
+                      <a:r>
+                        <a:rPr lang="ru-RU" sz="1600" dirty="0">
+                          <a:solidFill>
+                            <a:schemeClr val="accent3"/>
+                          </a:solidFill>
+                        </a:rPr>
+                        <a:t>Любые с ролью</a:t>
+                      </a:r>
+                      <a:r>
+                        <a:rPr lang="en-US" sz="1600" dirty="0">
+                          <a:solidFill>
+                            <a:schemeClr val="accent3"/>
+                          </a:solidFill>
+                        </a:rPr>
+                        <a:t> Reader</a:t>
                       </a:r>
                     </a:p>
                     <a:p>
                       <a:pPr lvl="1" algn="l"/>
                       <a:r>
+                        <a:rPr lang="ru-RU" sz="1600" i="1" dirty="0">
+                          <a:solidFill>
+                            <a:schemeClr val="accent3"/>
+                          </a:solidFill>
+                        </a:rPr>
+                        <a:t>Путь</a:t>
+                      </a:r>
+                      <a:r>
                         <a:rPr lang="en-US" sz="1600" i="1" dirty="0">
                           <a:solidFill>
                             <a:schemeClr val="accent3"/>
                           </a:solidFill>
                         </a:rPr>
-                        <a:t>Path: Channel/Application/</a:t>
+                        <a:t>: Channel/Application/</a:t>
                       </a:r>
                       <a:r>
                         <a:rPr lang="en-US" sz="1600" dirty="0" err="1">
@@ -7021,22 +7508,42 @@
                     <a:p>
                       <a:pPr lvl="1"/>
                       <a:r>
-                        <a:rPr lang="en-US" sz="1600" dirty="0"/>
-                        <a:t>Policy Type: Implicit Meta</a:t>
+                        <a:rPr lang="ru-RU" sz="1600" dirty="0"/>
+                        <a:t>Тип правил</a:t>
+                      </a:r>
+                      <a:r>
+                        <a:rPr lang="en-US" sz="1600" dirty="0"/>
+                        <a:t>: Implicit Meta</a:t>
                       </a:r>
                     </a:p>
                     <a:p>
                       <a:pPr lvl="1"/>
                       <a:r>
-                        <a:rPr lang="en-US" sz="1600" dirty="0"/>
-                        <a:t>Rule: Any Endorsement</a:t>
+                        <a:rPr lang="ru-RU" sz="1600" dirty="0"/>
+                        <a:t>Требование</a:t>
+                      </a:r>
+                      <a:r>
+                        <a:rPr lang="en-US" sz="1600" dirty="0"/>
+                        <a:t>: </a:t>
+                      </a:r>
+                      <a:r>
+                        <a:rPr lang="ru-RU" sz="1600" dirty="0"/>
+                        <a:t>Любые с ролью</a:t>
+                      </a:r>
+                      <a:r>
+                        <a:rPr lang="en-US" sz="1600" dirty="0"/>
+                        <a:t> Endorsement</a:t>
                       </a:r>
                     </a:p>
                     <a:p>
                       <a:pPr lvl="1" algn="l"/>
                       <a:r>
+                        <a:rPr lang="ru-RU" sz="1600" i="1" dirty="0"/>
+                        <a:t>Путь</a:t>
+                      </a:r>
+                      <a:r>
                         <a:rPr lang="en-US" sz="1600" i="1" dirty="0"/>
-                        <a:t>Path: Channel/Application/Endorsement</a:t>
+                        <a:t>: Channel/Application/Endorsement</a:t>
                       </a:r>
                     </a:p>
                   </a:txBody>
@@ -7104,7 +7611,7 @@
           <p:nvPr>
             <p:extLst>
               <p:ext uri="{D42A27DB-BD31-4B8C-83A1-F6EECF244321}">
-                <p14:modId xmlns:p14="http://schemas.microsoft.com/office/powerpoint/2010/main" val="3104660911"/>
+                <p14:modId xmlns:p14="http://schemas.microsoft.com/office/powerpoint/2010/main" val="1726085420"/>
               </p:ext>
             </p:extLst>
           </p:nvPr>
@@ -7136,8 +7643,8 @@
                     <a:p>
                       <a:pPr algn="ctr"/>
                       <a:r>
-                        <a:rPr lang="en-US" dirty="0"/>
-                        <a:t>Peer Organizations</a:t>
+                        <a:rPr lang="ru-RU" dirty="0"/>
+                        <a:t>Организации-члены канала</a:t>
                       </a:r>
                       <a:endParaRPr lang="en-US" i="1" dirty="0"/>
                     </a:p>
@@ -7200,8 +7707,12 @@
                     </a:p>
                     <a:p>
                       <a:r>
-                        <a:rPr lang="en-US" sz="1600" dirty="0"/>
-                        <a:t>Signature Policies:</a:t>
+                        <a:rPr lang="ru-RU" sz="1600" dirty="0"/>
+                        <a:t>Правила подписи</a:t>
+                      </a:r>
+                      <a:r>
+                        <a:rPr lang="en-US" sz="1600" dirty="0"/>
+                        <a:t>:</a:t>
                       </a:r>
                     </a:p>
                     <a:p>
@@ -7303,8 +7814,12 @@
                     </a:p>
                     <a:p>
                       <a:r>
-                        <a:rPr lang="en-US" sz="1600" dirty="0"/>
-                        <a:t>Signature Policies:</a:t>
+                        <a:rPr lang="ru-RU" sz="1600" dirty="0"/>
+                        <a:t>Правила подписи</a:t>
+                      </a:r>
+                      <a:r>
+                        <a:rPr lang="en-US" sz="1600" dirty="0"/>
+                        <a:t>:</a:t>
                       </a:r>
                     </a:p>
                     <a:p>
@@ -7413,12 +7928,20 @@
                     </a:p>
                     <a:p>
                       <a:r>
+                        <a:rPr lang="ru-RU" sz="1600" dirty="0">
+                          <a:solidFill>
+                            <a:schemeClr val="accent3"/>
+                          </a:solidFill>
+                        </a:rPr>
+                        <a:t>Правила подписи</a:t>
+                      </a:r>
+                      <a:r>
                         <a:rPr lang="en-US" sz="1600" dirty="0">
                           <a:solidFill>
                             <a:schemeClr val="accent3"/>
                           </a:solidFill>
                         </a:rPr>
-                        <a:t>Signature Policies:</a:t>
+                        <a:t>:</a:t>
                       </a:r>
                     </a:p>
                     <a:p>
@@ -7618,7 +8141,7 @@
         </p:blipFill>
         <p:spPr>
           <a:xfrm>
-            <a:off x="4423867" y="5624721"/>
+            <a:off x="4512003" y="5624721"/>
             <a:ext cx="562428" cy="562428"/>
           </a:xfrm>
           <a:prstGeom prst="rect">
@@ -7672,7 +8195,7 @@
             <p:ph idx="1"/>
             <p:extLst>
               <p:ext uri="{D42A27DB-BD31-4B8C-83A1-F6EECF244321}">
-                <p14:modId xmlns:p14="http://schemas.microsoft.com/office/powerpoint/2010/main" val="2046270429"/>
+                <p14:modId xmlns:p14="http://schemas.microsoft.com/office/powerpoint/2010/main" val="531468807"/>
               </p:ext>
             </p:extLst>
           </p:nvPr>
@@ -7704,15 +8227,20 @@
                     <a:p>
                       <a:pPr algn="ctr"/>
                       <a:r>
-                        <a:rPr lang="en-US" dirty="0"/>
-                        <a:t>Application policies</a:t>
-                      </a:r>
+                        <a:rPr lang="ru-RU" dirty="0"/>
+                        <a:t>Правила приложения</a:t>
+                      </a:r>
+                      <a:endParaRPr lang="en-US" dirty="0"/>
                     </a:p>
                     <a:p>
                       <a:pPr algn="ctr"/>
                       <a:r>
+                        <a:rPr lang="ru-RU" i="1" dirty="0"/>
+                        <a:t>Путь к правилам</a:t>
+                      </a:r>
+                      <a:r>
                         <a:rPr lang="en-US" i="1" dirty="0"/>
-                        <a:t>Policy path: Channel/Application</a:t>
+                        <a:t>: Channel/Application</a:t>
                       </a:r>
                     </a:p>
                   </a:txBody>
@@ -7779,34 +8307,74 @@
                     <a:p>
                       <a:pPr lvl="1"/>
                       <a:r>
+                        <a:rPr lang="ru-RU" sz="1600" dirty="0">
+                          <a:solidFill>
+                            <a:schemeClr val="accent3"/>
+                          </a:solidFill>
+                        </a:rPr>
+                        <a:t>Тип правил</a:t>
+                      </a:r>
+                      <a:r>
                         <a:rPr lang="en-US" sz="1600" dirty="0">
                           <a:solidFill>
                             <a:schemeClr val="accent3"/>
                           </a:solidFill>
                         </a:rPr>
-                        <a:t>Policy Type: Implicit Meta</a:t>
+                        <a:t>: Implicit Meta</a:t>
                       </a:r>
                     </a:p>
                     <a:p>
                       <a:pPr lvl="1"/>
                       <a:r>
+                        <a:rPr lang="ru-RU" sz="1600" dirty="0">
+                          <a:solidFill>
+                            <a:schemeClr val="accent3"/>
+                          </a:solidFill>
+                        </a:rPr>
+                        <a:t>Требование</a:t>
+                      </a:r>
+                      <a:r>
                         <a:rPr lang="en-US" sz="1600" dirty="0">
                           <a:solidFill>
                             <a:schemeClr val="accent3"/>
                           </a:solidFill>
                         </a:rPr>
-                        <a:t>Rule: Majority Admins</a:t>
+                        <a:t>: </a:t>
+                      </a:r>
+                      <a:r>
+                        <a:rPr lang="ru-RU" sz="1600" dirty="0">
+                          <a:solidFill>
+                            <a:schemeClr val="accent3"/>
+                          </a:solidFill>
+                        </a:rPr>
+                        <a:t>Большинство с ролью</a:t>
+                      </a:r>
+                      <a:r>
+                        <a:rPr lang="en-US" sz="1600" dirty="0">
+                          <a:solidFill>
+                            <a:schemeClr val="accent3"/>
+                          </a:solidFill>
+                        </a:rPr>
+                        <a:t> Admin</a:t>
                       </a:r>
                     </a:p>
                     <a:p>
                       <a:pPr lvl="1" algn="l"/>
                       <a:r>
+                        <a:rPr lang="ru-RU" sz="1600" i="1" dirty="0">
+                          <a:solidFill>
+                            <a:schemeClr val="accent3"/>
+                          </a:solidFill>
+                        </a:rPr>
+                        <a:t>Путь</a:t>
+                      </a:r>
+                      <a:r>
                         <a:rPr lang="en-US" sz="1600" i="1" dirty="0">
                           <a:solidFill>
                             <a:schemeClr val="accent3"/>
                           </a:solidFill>
                         </a:rPr>
-                        <a:t>Path: Channel/Application/Admins</a:t>
+                        <a:t>: Channel/Application/Admins</a:t>
                       </a:r>
                     </a:p>
                   </a:txBody>
@@ -7869,22 +8437,42 @@
                     <a:p>
                       <a:pPr lvl="1"/>
                       <a:r>
-                        <a:rPr lang="en-US" sz="1600" dirty="0"/>
-                        <a:t>Policy Type: Implicit Meta</a:t>
+                        <a:rPr lang="ru-RU" sz="1600" dirty="0"/>
+                        <a:t>Тип правил</a:t>
+                      </a:r>
+                      <a:r>
+                        <a:rPr lang="en-US" sz="1600" dirty="0"/>
+                        <a:t>: Implicit Meta</a:t>
                       </a:r>
                     </a:p>
                     <a:p>
                       <a:pPr lvl="1"/>
                       <a:r>
-                        <a:rPr lang="en-US" sz="1600" dirty="0"/>
-                        <a:t>Rule: Any Writers</a:t>
+                        <a:rPr lang="ru-RU" sz="1600" dirty="0"/>
+                        <a:t>Требование</a:t>
+                      </a:r>
+                      <a:r>
+                        <a:rPr lang="en-US" sz="1600" dirty="0"/>
+                        <a:t>: </a:t>
+                      </a:r>
+                      <a:r>
+                        <a:rPr lang="ru-RU" sz="1600" dirty="0"/>
+                        <a:t>Любые с ролью</a:t>
+                      </a:r>
+                      <a:r>
+                        <a:rPr lang="en-US" sz="1600" dirty="0"/>
+                        <a:t> Writer</a:t>
                       </a:r>
                     </a:p>
                     <a:p>
                       <a:pPr lvl="1" algn="l"/>
                       <a:r>
+                        <a:rPr lang="ru-RU" sz="1600" i="1" dirty="0"/>
+                        <a:t>Путь</a:t>
+                      </a:r>
+                      <a:r>
                         <a:rPr lang="en-US" sz="1600" i="1" dirty="0"/>
-                        <a:t>Path: Channel/Application/Writers</a:t>
+                        <a:t>: Channel/Application/Writers</a:t>
                       </a:r>
                     </a:p>
                   </a:txBody>
@@ -7951,34 +8539,74 @@
                     <a:p>
                       <a:pPr lvl="1"/>
                       <a:r>
+                        <a:rPr lang="ru-RU" sz="1600" dirty="0">
+                          <a:solidFill>
+                            <a:schemeClr val="accent3"/>
+                          </a:solidFill>
+                        </a:rPr>
+                        <a:t>Тип правил</a:t>
+                      </a:r>
+                      <a:r>
                         <a:rPr lang="en-US" sz="1600" dirty="0">
                           <a:solidFill>
                             <a:schemeClr val="accent3"/>
                           </a:solidFill>
                         </a:rPr>
-                        <a:t>Policy Type: Implicit Meta</a:t>
+                        <a:t>: Implicit Meta</a:t>
                       </a:r>
                     </a:p>
                     <a:p>
                       <a:pPr lvl="1"/>
                       <a:r>
+                        <a:rPr lang="ru-RU" sz="1600" dirty="0">
+                          <a:solidFill>
+                            <a:schemeClr val="accent3"/>
+                          </a:solidFill>
+                        </a:rPr>
+                        <a:t>Требование</a:t>
+                      </a:r>
+                      <a:r>
                         <a:rPr lang="en-US" sz="1600" dirty="0">
                           <a:solidFill>
                             <a:schemeClr val="accent3"/>
                           </a:solidFill>
                         </a:rPr>
-                        <a:t>Rule: Any Readers</a:t>
+                        <a:t>: </a:t>
+                      </a:r>
+                      <a:r>
+                        <a:rPr lang="ru-RU" sz="1600" dirty="0">
+                          <a:solidFill>
+                            <a:schemeClr val="accent3"/>
+                          </a:solidFill>
+                        </a:rPr>
+                        <a:t>Любые с ролью</a:t>
+                      </a:r>
+                      <a:r>
+                        <a:rPr lang="en-US" sz="1600" dirty="0">
+                          <a:solidFill>
+                            <a:schemeClr val="accent3"/>
+                          </a:solidFill>
+                        </a:rPr>
+                        <a:t> Reader</a:t>
                       </a:r>
                     </a:p>
                     <a:p>
                       <a:pPr lvl="1" algn="l"/>
                       <a:r>
+                        <a:rPr lang="ru-RU" sz="1600" i="1" dirty="0">
+                          <a:solidFill>
+                            <a:schemeClr val="accent3"/>
+                          </a:solidFill>
+                        </a:rPr>
+                        <a:t>Путь</a:t>
+                      </a:r>
+                      <a:r>
                         <a:rPr lang="en-US" sz="1600" i="1" dirty="0">
                           <a:solidFill>
                             <a:schemeClr val="accent3"/>
                           </a:solidFill>
                         </a:rPr>
-                        <a:t>Path: Channel/Application/Readers</a:t>
+                        <a:t>: Channel/Application/Readers</a:t>
                       </a:r>
                     </a:p>
                   </a:txBody>
@@ -8050,34 +8678,74 @@
                     <a:p>
                       <a:pPr lvl="1"/>
                       <a:r>
+                        <a:rPr lang="ru-RU" sz="1600" dirty="0">
+                          <a:solidFill>
+                            <a:schemeClr val="accent3"/>
+                          </a:solidFill>
+                        </a:rPr>
+                        <a:t>Тип правил</a:t>
+                      </a:r>
+                      <a:r>
                         <a:rPr lang="en-US" sz="1600" dirty="0">
                           <a:solidFill>
                             <a:schemeClr val="accent3"/>
                           </a:solidFill>
                         </a:rPr>
-                        <a:t>Policy Type: Implicit Meta</a:t>
+                        <a:t>: Implicit Meta</a:t>
                       </a:r>
                     </a:p>
                     <a:p>
                       <a:pPr lvl="1"/>
                       <a:r>
+                        <a:rPr lang="ru-RU" sz="1600" dirty="0">
+                          <a:solidFill>
+                            <a:schemeClr val="accent3"/>
+                          </a:solidFill>
+                        </a:rPr>
+                        <a:t>Требование</a:t>
+                      </a:r>
+                      <a:r>
                         <a:rPr lang="en-US" sz="1600" dirty="0">
                           <a:solidFill>
                             <a:schemeClr val="accent3"/>
                           </a:solidFill>
                         </a:rPr>
-                        <a:t>Rule: Any Readers</a:t>
+                        <a:t>: </a:t>
+                      </a:r>
+                      <a:r>
+                        <a:rPr lang="ru-RU" sz="1600" dirty="0">
+                          <a:solidFill>
+                            <a:schemeClr val="accent3"/>
+                          </a:solidFill>
+                        </a:rPr>
+                        <a:t>Любые с ролью</a:t>
+                      </a:r>
+                      <a:r>
+                        <a:rPr lang="en-US" sz="1600" dirty="0">
+                          <a:solidFill>
+                            <a:schemeClr val="accent3"/>
+                          </a:solidFill>
+                        </a:rPr>
+                        <a:t> Reader</a:t>
                       </a:r>
                     </a:p>
                     <a:p>
                       <a:pPr lvl="1" algn="l"/>
                       <a:r>
+                        <a:rPr lang="ru-RU" sz="1600" i="1" dirty="0">
+                          <a:solidFill>
+                            <a:schemeClr val="accent3"/>
+                          </a:solidFill>
+                        </a:rPr>
+                        <a:t>Путь</a:t>
+                      </a:r>
+                      <a:r>
                         <a:rPr lang="en-US" sz="1600" i="1" dirty="0">
                           <a:solidFill>
                             <a:schemeClr val="accent3"/>
                           </a:solidFill>
                         </a:rPr>
-                        <a:t>Path: Channel/Application/</a:t>
+                        <a:t>: Channel/Application/</a:t>
                       </a:r>
                       <a:r>
                         <a:rPr lang="en-US" sz="1600" dirty="0" err="1">
@@ -8157,34 +8825,74 @@
                     <a:p>
                       <a:pPr lvl="1"/>
                       <a:r>
+                        <a:rPr lang="ru-RU" sz="1600" dirty="0">
+                          <a:solidFill>
+                            <a:schemeClr val="accent3"/>
+                          </a:solidFill>
+                        </a:rPr>
+                        <a:t>Тип правил</a:t>
+                      </a:r>
+                      <a:r>
                         <a:rPr lang="en-US" sz="1600" dirty="0">
                           <a:solidFill>
                             <a:schemeClr val="accent3"/>
                           </a:solidFill>
                         </a:rPr>
-                        <a:t>Policy Type: Implicit Meta</a:t>
+                        <a:t>: Implicit Meta</a:t>
                       </a:r>
                     </a:p>
                     <a:p>
                       <a:pPr lvl="1"/>
                       <a:r>
+                        <a:rPr lang="ru-RU" sz="1600" dirty="0">
+                          <a:solidFill>
+                            <a:schemeClr val="accent3"/>
+                          </a:solidFill>
+                        </a:rPr>
+                        <a:t>Требование</a:t>
+                      </a:r>
+                      <a:r>
                         <a:rPr lang="en-US" sz="1600" dirty="0">
                           <a:solidFill>
                             <a:schemeClr val="accent3"/>
                           </a:solidFill>
                         </a:rPr>
-                        <a:t>Rule: Any Endorsement</a:t>
+                        <a:t>: </a:t>
+                      </a:r>
+                      <a:r>
+                        <a:rPr lang="ru-RU" sz="1600" dirty="0">
+                          <a:solidFill>
+                            <a:schemeClr val="accent3"/>
+                          </a:solidFill>
+                        </a:rPr>
+                        <a:t>Любые с ролью</a:t>
+                      </a:r>
+                      <a:r>
+                        <a:rPr lang="en-US" sz="1600" dirty="0">
+                          <a:solidFill>
+                            <a:schemeClr val="accent3"/>
+                          </a:solidFill>
+                        </a:rPr>
+                        <a:t> Endorsement</a:t>
                       </a:r>
                     </a:p>
                     <a:p>
                       <a:pPr lvl="1" algn="l"/>
                       <a:r>
+                        <a:rPr lang="ru-RU" sz="1600" i="1" dirty="0">
+                          <a:solidFill>
+                            <a:schemeClr val="accent3"/>
+                          </a:solidFill>
+                        </a:rPr>
+                        <a:t>Путь</a:t>
+                      </a:r>
+                      <a:r>
                         <a:rPr lang="en-US" sz="1600" i="1" dirty="0">
                           <a:solidFill>
                             <a:schemeClr val="accent3"/>
                           </a:solidFill>
                         </a:rPr>
-                        <a:t>Path: Channel/Application/Endorsement</a:t>
+                        <a:t>: Channel/Application/Endorsement</a:t>
                       </a:r>
                     </a:p>
                   </a:txBody>
@@ -8252,7 +8960,7 @@
           <p:nvPr>
             <p:extLst>
               <p:ext uri="{D42A27DB-BD31-4B8C-83A1-F6EECF244321}">
-                <p14:modId xmlns:p14="http://schemas.microsoft.com/office/powerpoint/2010/main" val="1178404949"/>
+                <p14:modId xmlns:p14="http://schemas.microsoft.com/office/powerpoint/2010/main" val="3065466687"/>
               </p:ext>
             </p:extLst>
           </p:nvPr>
@@ -8284,8 +8992,8 @@
                     <a:p>
                       <a:pPr algn="ctr"/>
                       <a:r>
-                        <a:rPr lang="en-US" dirty="0"/>
-                        <a:t>Peer Organizations</a:t>
+                        <a:rPr lang="ru-RU" dirty="0"/>
+                        <a:t>Организации-члены канала</a:t>
                       </a:r>
                       <a:endParaRPr lang="en-US" i="1" dirty="0"/>
                     </a:p>
@@ -8348,8 +9056,12 @@
                     </a:p>
                     <a:p>
                       <a:r>
-                        <a:rPr lang="en-US" sz="1600" dirty="0"/>
-                        <a:t>Signature Policies:</a:t>
+                        <a:rPr lang="ru-RU" sz="1600" dirty="0"/>
+                        <a:t>Правила подписи</a:t>
+                      </a:r>
+                      <a:r>
+                        <a:rPr lang="en-US" sz="1600" dirty="0"/>
+                        <a:t>:</a:t>
                       </a:r>
                     </a:p>
                     <a:p>
@@ -8455,12 +9167,20 @@
                     </a:p>
                     <a:p>
                       <a:r>
+                        <a:rPr lang="ru-RU" sz="1600" dirty="0">
+                          <a:solidFill>
+                            <a:schemeClr val="accent3"/>
+                          </a:solidFill>
+                        </a:rPr>
+                        <a:t>Правила подписи</a:t>
+                      </a:r>
+                      <a:r>
                         <a:rPr lang="en-US" sz="1600" dirty="0">
                           <a:solidFill>
                             <a:schemeClr val="accent3"/>
                           </a:solidFill>
                         </a:rPr>
-                        <a:t>Signature Policies:</a:t>
+                        <a:t>:</a:t>
                       </a:r>
                     </a:p>
                     <a:p>
@@ -8577,12 +9297,20 @@
                     </a:p>
                     <a:p>
                       <a:r>
+                        <a:rPr lang="ru-RU" sz="1600" dirty="0">
+                          <a:solidFill>
+                            <a:schemeClr val="accent3"/>
+                          </a:solidFill>
+                        </a:rPr>
+                        <a:t>Правила подписи</a:t>
+                      </a:r>
+                      <a:r>
                         <a:rPr lang="en-US" sz="1600" dirty="0">
                           <a:solidFill>
                             <a:schemeClr val="accent3"/>
                           </a:solidFill>
                         </a:rPr>
-                        <a:t>Signature Policies:</a:t>
+                        <a:t>:</a:t>
                       </a:r>
                     </a:p>
                     <a:p>
@@ -8804,14 +9532,14 @@
             <p:ph idx="1"/>
             <p:extLst>
               <p:ext uri="{D42A27DB-BD31-4B8C-83A1-F6EECF244321}">
-                <p14:modId xmlns:p14="http://schemas.microsoft.com/office/powerpoint/2010/main" val="856504618"/>
+                <p14:modId xmlns:p14="http://schemas.microsoft.com/office/powerpoint/2010/main" val="3179355335"/>
               </p:ext>
             </p:extLst>
           </p:nvPr>
         </p:nvGraphicFramePr>
         <p:xfrm>
           <a:off x="553994" y="397374"/>
-          <a:ext cx="4351638" cy="4907280"/>
+          <a:ext cx="4521504" cy="4907280"/>
         </p:xfrm>
         <a:graphic>
           <a:graphicData uri="http://schemas.openxmlformats.org/drawingml/2006/table">
@@ -8820,7 +9548,7 @@
                 <a:tableStyleId>{2D5ABB26-0587-4C30-8999-92F81FD0307C}</a:tableStyleId>
               </a:tblPr>
               <a:tblGrid>
-                <a:gridCol w="4351638">
+                <a:gridCol w="4521504">
                   <a:extLst>
                     <a:ext uri="{9D8B030D-6E8A-4147-A177-3AD203B41FA5}">
                       <a16:colId xmlns:a16="http://schemas.microsoft.com/office/drawing/2014/main" val="247573138"/>
@@ -8836,19 +9564,20 @@
                     <a:p>
                       <a:pPr algn="ctr"/>
                       <a:r>
-                        <a:rPr lang="en-US" dirty="0" err="1"/>
-                        <a:t>Orderer</a:t>
-                      </a:r>
-                      <a:r>
-                        <a:rPr lang="en-US" dirty="0"/>
-                        <a:t> policies</a:t>
-                      </a:r>
+                        <a:rPr lang="ru-RU" dirty="0"/>
+                        <a:t>Правила службы упорядочения</a:t>
+                      </a:r>
+                      <a:endParaRPr lang="en-US" dirty="0"/>
                     </a:p>
                     <a:p>
                       <a:pPr algn="ctr"/>
                       <a:r>
+                        <a:rPr lang="ru-RU" i="1" dirty="0"/>
+                        <a:t>Путь к правилам</a:t>
+                      </a:r>
+                      <a:r>
                         <a:rPr lang="en-US" i="1" dirty="0"/>
-                        <a:t>Policy path: Channel/</a:t>
+                        <a:t>: Channel/</a:t>
                       </a:r>
                       <a:r>
                         <a:rPr lang="en-US" i="1" dirty="0" err="1"/>
@@ -8914,24 +9643,50 @@
                       </a:r>
                     </a:p>
                     <a:p>
-                      <a:pPr lvl="1"/>
-                      <a:r>
-                        <a:rPr lang="en-US" sz="1600" dirty="0"/>
-                        <a:t>Policy Type: Implicit Meta</a:t>
-                      </a:r>
-                    </a:p>
-                    <a:p>
-                      <a:pPr lvl="1"/>
-                      <a:r>
-                        <a:rPr lang="en-US" sz="1600" dirty="0"/>
-                        <a:t>Rule: Majority Admins</a:t>
-                      </a:r>
-                    </a:p>
-                    <a:p>
-                      <a:pPr lvl="1" algn="l"/>
+                      <a:pPr marL="273050" lvl="1" indent="0">
+                        <a:tabLst/>
+                      </a:pPr>
+                      <a:r>
+                        <a:rPr lang="ru-RU" sz="1600" dirty="0"/>
+                        <a:t>Тип правил</a:t>
+                      </a:r>
+                      <a:r>
+                        <a:rPr lang="en-US" sz="1600" dirty="0"/>
+                        <a:t>: Implicit Meta</a:t>
+                      </a:r>
+                    </a:p>
+                    <a:p>
+                      <a:pPr marL="273050" lvl="1" indent="0">
+                        <a:tabLst/>
+                      </a:pPr>
+                      <a:r>
+                        <a:rPr lang="ru-RU" sz="1600" dirty="0"/>
+                        <a:t>Требование</a:t>
+                      </a:r>
+                      <a:r>
+                        <a:rPr lang="en-US" sz="1600" dirty="0"/>
+                        <a:t>: </a:t>
+                      </a:r>
+                      <a:r>
+                        <a:rPr lang="ru-RU" sz="1600" dirty="0"/>
+                        <a:t>Большинство с ролью</a:t>
+                      </a:r>
+                      <a:r>
+                        <a:rPr lang="en-US" sz="1600" dirty="0"/>
+                        <a:t> Admin</a:t>
+                      </a:r>
+                    </a:p>
+                    <a:p>
+                      <a:pPr marL="273050" lvl="1" indent="0" algn="l">
+                        <a:tabLst/>
+                      </a:pPr>
+                      <a:r>
+                        <a:rPr lang="ru-RU" sz="1600" i="1" dirty="0"/>
+                        <a:t>Путь</a:t>
+                      </a:r>
                       <a:r>
                         <a:rPr lang="en-US" sz="1600" i="1" dirty="0"/>
-                        <a:t>Path: Channel/</a:t>
+                        <a:t>: Channel/</a:t>
                       </a:r>
                       <a:r>
                         <a:rPr lang="en-US" sz="1600" i="1" dirty="0" err="1"/>
@@ -9000,24 +9755,50 @@
                       </a:r>
                     </a:p>
                     <a:p>
-                      <a:pPr lvl="1"/>
-                      <a:r>
-                        <a:rPr lang="en-US" sz="1600" dirty="0"/>
-                        <a:t>Policy Type: Implicit Meta</a:t>
-                      </a:r>
-                    </a:p>
-                    <a:p>
-                      <a:pPr lvl="1"/>
-                      <a:r>
-                        <a:rPr lang="en-US" sz="1600" dirty="0"/>
-                        <a:t>Rule: Any Writers</a:t>
-                      </a:r>
-                    </a:p>
-                    <a:p>
-                      <a:pPr lvl="1" algn="l"/>
+                      <a:pPr marL="273050" lvl="1" indent="0">
+                        <a:tabLst/>
+                      </a:pPr>
+                      <a:r>
+                        <a:rPr lang="ru-RU" sz="1600" dirty="0"/>
+                        <a:t>Тип правил</a:t>
+                      </a:r>
+                      <a:r>
+                        <a:rPr lang="en-US" sz="1600" dirty="0"/>
+                        <a:t>: Implicit Meta</a:t>
+                      </a:r>
+                    </a:p>
+                    <a:p>
+                      <a:pPr marL="273050" lvl="1" indent="0">
+                        <a:tabLst/>
+                      </a:pPr>
+                      <a:r>
+                        <a:rPr lang="ru-RU" sz="1600" dirty="0"/>
+                        <a:t>Требование</a:t>
+                      </a:r>
+                      <a:r>
+                        <a:rPr lang="en-US" sz="1600" dirty="0"/>
+                        <a:t>: </a:t>
+                      </a:r>
+                      <a:r>
+                        <a:rPr lang="ru-RU" sz="1600" dirty="0"/>
+                        <a:t>Любые с ролью</a:t>
+                      </a:r>
+                      <a:r>
+                        <a:rPr lang="en-US" sz="1600" dirty="0"/>
+                        <a:t> Writer</a:t>
+                      </a:r>
+                    </a:p>
+                    <a:p>
+                      <a:pPr marL="273050" lvl="1" indent="0" algn="l">
+                        <a:tabLst/>
+                      </a:pPr>
+                      <a:r>
+                        <a:rPr lang="ru-RU" sz="1600" i="1" dirty="0"/>
+                        <a:t>Путь</a:t>
+                      </a:r>
                       <a:r>
                         <a:rPr lang="en-US" sz="1600" i="1" dirty="0"/>
-                        <a:t>Path: Channel/</a:t>
+                        <a:t>: Channel/</a:t>
                       </a:r>
                       <a:r>
                         <a:rPr lang="en-US" sz="1600" i="1" dirty="0" err="1"/>
@@ -9086,24 +9867,50 @@
                       </a:r>
                     </a:p>
                     <a:p>
-                      <a:pPr lvl="1"/>
-                      <a:r>
-                        <a:rPr lang="en-US" sz="1600" dirty="0"/>
-                        <a:t>Policy Type: Implicit Meta</a:t>
-                      </a:r>
-                    </a:p>
-                    <a:p>
-                      <a:pPr lvl="1"/>
-                      <a:r>
-                        <a:rPr lang="en-US" sz="1600" dirty="0"/>
-                        <a:t>Rule: Any Readers</a:t>
-                      </a:r>
-                    </a:p>
-                    <a:p>
-                      <a:pPr lvl="1" algn="l"/>
+                      <a:pPr marL="273050" lvl="1" indent="0">
+                        <a:tabLst/>
+                      </a:pPr>
+                      <a:r>
+                        <a:rPr lang="ru-RU" sz="1600" dirty="0"/>
+                        <a:t>Тип правил</a:t>
+                      </a:r>
+                      <a:r>
+                        <a:rPr lang="en-US" sz="1600" dirty="0"/>
+                        <a:t>: Implicit Meta</a:t>
+                      </a:r>
+                    </a:p>
+                    <a:p>
+                      <a:pPr marL="273050" lvl="1" indent="0">
+                        <a:tabLst/>
+                      </a:pPr>
+                      <a:r>
+                        <a:rPr lang="ru-RU" sz="1600" dirty="0"/>
+                        <a:t>Требование</a:t>
+                      </a:r>
+                      <a:r>
+                        <a:rPr lang="en-US" sz="1600" dirty="0"/>
+                        <a:t>: </a:t>
+                      </a:r>
+                      <a:r>
+                        <a:rPr lang="ru-RU" sz="1600" dirty="0"/>
+                        <a:t>Любые с ролью</a:t>
+                      </a:r>
+                      <a:r>
+                        <a:rPr lang="en-US" sz="1600" dirty="0"/>
+                        <a:t> Reader</a:t>
+                      </a:r>
+                    </a:p>
+                    <a:p>
+                      <a:pPr marL="273050" lvl="1" indent="0" algn="l">
+                        <a:tabLst/>
+                      </a:pPr>
+                      <a:r>
+                        <a:rPr lang="ru-RU" sz="1600" i="1" dirty="0"/>
+                        <a:t>Путь</a:t>
+                      </a:r>
                       <a:r>
                         <a:rPr lang="en-US" sz="1600" i="1" dirty="0"/>
-                        <a:t>Path: Channel/</a:t>
+                        <a:t>: Channel/</a:t>
                       </a:r>
                       <a:r>
                         <a:rPr lang="en-US" sz="1600" i="1" dirty="0" err="1"/>
@@ -9173,24 +9980,50 @@
                       <a:endParaRPr lang="en-US" sz="1600" dirty="0"/>
                     </a:p>
                     <a:p>
-                      <a:pPr lvl="1"/>
-                      <a:r>
-                        <a:rPr lang="en-US" sz="1600" dirty="0"/>
-                        <a:t>Policy Type: Implicit Meta</a:t>
-                      </a:r>
-                    </a:p>
-                    <a:p>
-                      <a:pPr lvl="1"/>
-                      <a:r>
-                        <a:rPr lang="en-US" sz="1600" dirty="0"/>
-                        <a:t>Rule: Any Writers</a:t>
-                      </a:r>
-                    </a:p>
-                    <a:p>
-                      <a:pPr lvl="1" algn="l"/>
+                      <a:pPr marL="273050" lvl="1" indent="0">
+                        <a:tabLst/>
+                      </a:pPr>
+                      <a:r>
+                        <a:rPr lang="ru-RU" sz="1600" dirty="0"/>
+                        <a:t>Тип правил</a:t>
+                      </a:r>
+                      <a:r>
+                        <a:rPr lang="en-US" sz="1600" dirty="0"/>
+                        <a:t>: Implicit Meta</a:t>
+                      </a:r>
+                    </a:p>
+                    <a:p>
+                      <a:pPr marL="273050" lvl="1" indent="0">
+                        <a:tabLst/>
+                      </a:pPr>
+                      <a:r>
+                        <a:rPr lang="ru-RU" sz="1600" dirty="0"/>
+                        <a:t>Требование</a:t>
+                      </a:r>
+                      <a:r>
+                        <a:rPr lang="en-US" sz="1600" dirty="0"/>
+                        <a:t>: </a:t>
+                      </a:r>
+                      <a:r>
+                        <a:rPr lang="ru-RU" sz="1600" dirty="0"/>
+                        <a:t>Любые с ролью</a:t>
+                      </a:r>
+                      <a:r>
+                        <a:rPr lang="en-US" sz="1600" dirty="0"/>
+                        <a:t> Writer</a:t>
+                      </a:r>
+                    </a:p>
+                    <a:p>
+                      <a:pPr marL="273050" lvl="1" indent="0" algn="l">
+                        <a:tabLst/>
+                      </a:pPr>
+                      <a:r>
+                        <a:rPr lang="ru-RU" sz="1600" i="1" dirty="0"/>
+                        <a:t>Путь</a:t>
+                      </a:r>
                       <a:r>
                         <a:rPr lang="en-US" sz="1600" i="1" dirty="0"/>
-                        <a:t>Path: Channel/</a:t>
+                        <a:t>: Channel/</a:t>
                       </a:r>
                       <a:r>
                         <a:rPr lang="en-US" sz="1600" i="1" dirty="0" err="1"/>
@@ -9271,14 +10104,14 @@
           <p:nvPr>
             <p:extLst>
               <p:ext uri="{D42A27DB-BD31-4B8C-83A1-F6EECF244321}">
-                <p14:modId xmlns:p14="http://schemas.microsoft.com/office/powerpoint/2010/main" val="502725439"/>
+                <p14:modId xmlns:p14="http://schemas.microsoft.com/office/powerpoint/2010/main" val="1236743180"/>
               </p:ext>
             </p:extLst>
           </p:nvPr>
         </p:nvGraphicFramePr>
         <p:xfrm>
-          <a:off x="4905631" y="397376"/>
-          <a:ext cx="2522840" cy="4907277"/>
+          <a:off x="5075499" y="397376"/>
+          <a:ext cx="2352971" cy="4907277"/>
         </p:xfrm>
         <a:graphic>
           <a:graphicData uri="http://schemas.openxmlformats.org/drawingml/2006/table">
@@ -9287,7 +10120,7 @@
                 <a:tableStyleId>{2D5ABB26-0587-4C30-8999-92F81FD0307C}</a:tableStyleId>
               </a:tblPr>
               <a:tblGrid>
-                <a:gridCol w="2522840">
+                <a:gridCol w="2352971">
                   <a:extLst>
                     <a:ext uri="{9D8B030D-6E8A-4147-A177-3AD203B41FA5}">
                       <a16:colId xmlns:a16="http://schemas.microsoft.com/office/drawing/2014/main" val="247573138"/>
@@ -9303,9 +10136,10 @@
                     <a:p>
                       <a:pPr algn="ctr"/>
                       <a:r>
-                        <a:rPr lang="en-US" dirty="0"/>
-                        <a:t>Ordering service Organizations</a:t>
-                      </a:r>
+                        <a:rPr lang="ru-RU" dirty="0"/>
+                        <a:t>Организации службы упорядочения</a:t>
+                      </a:r>
+                      <a:endParaRPr lang="en-US" dirty="0"/>
                     </a:p>
                   </a:txBody>
                   <a:tcPr>
@@ -9366,8 +10200,12 @@
                     </a:p>
                     <a:p>
                       <a:r>
-                        <a:rPr lang="en-US" sz="1600" dirty="0"/>
-                        <a:t>Signature Policies:</a:t>
+                        <a:rPr lang="ru-RU" sz="1600" dirty="0"/>
+                        <a:t>Правила подписи</a:t>
+                      </a:r>
+                      <a:r>
+                        <a:rPr lang="en-US" sz="1600" dirty="0"/>
+                        <a:t>:</a:t>
                       </a:r>
                     </a:p>
                     <a:p>
@@ -9450,8 +10288,12 @@
                     </a:p>
                     <a:p>
                       <a:r>
-                        <a:rPr lang="en-US" sz="1600" dirty="0"/>
-                        <a:t>Signature Policies:</a:t>
+                        <a:rPr lang="ru-RU" sz="1600" dirty="0"/>
+                        <a:t>Правила подписи</a:t>
+                      </a:r>
+                      <a:r>
+                        <a:rPr lang="en-US" sz="1600" dirty="0"/>
+                        <a:t>:</a:t>
                       </a:r>
                     </a:p>
                     <a:p>
@@ -9534,8 +10376,12 @@
                     </a:p>
                     <a:p>
                       <a:r>
-                        <a:rPr lang="en-US" sz="1600" dirty="0"/>
-                        <a:t>Signature Policies:</a:t>
+                        <a:rPr lang="ru-RU" sz="1600" dirty="0"/>
+                        <a:t>Правила подписи</a:t>
+                      </a:r>
+                      <a:r>
+                        <a:rPr lang="en-US" sz="1600" dirty="0"/>
+                        <a:t>:</a:t>
                       </a:r>
                     </a:p>
                     <a:p>
@@ -9609,52 +10455,6 @@
           </a:graphicData>
         </a:graphic>
       </p:graphicFrame>
-      <p:cxnSp>
-        <p:nvCxnSpPr>
-          <p:cNvPr id="34" name="Straight Connector 33">
-            <a:extLst>
-              <a:ext uri="{FF2B5EF4-FFF2-40B4-BE49-F238E27FC236}">
-                <a16:creationId xmlns:a16="http://schemas.microsoft.com/office/drawing/2014/main" id="{02703040-D1F2-3245-BFC6-78B95311EC34}"/>
-              </a:ext>
-            </a:extLst>
-          </p:cNvPr>
-          <p:cNvCxnSpPr>
-            <a:cxnSpLocks/>
-          </p:cNvCxnSpPr>
-          <p:nvPr/>
-        </p:nvCxnSpPr>
-        <p:spPr>
-          <a:xfrm>
-            <a:off x="3076833" y="1705233"/>
-            <a:ext cx="1334530" cy="0"/>
-          </a:xfrm>
-          <a:prstGeom prst="line">
-            <a:avLst/>
-          </a:prstGeom>
-          <a:ln w="38100">
-            <a:solidFill>
-              <a:schemeClr val="bg1">
-                <a:lumMod val="50000"/>
-              </a:schemeClr>
-            </a:solidFill>
-            <a:prstDash val="lgDash"/>
-          </a:ln>
-        </p:spPr>
-        <p:style>
-          <a:lnRef idx="1">
-            <a:schemeClr val="accent1"/>
-          </a:lnRef>
-          <a:fillRef idx="0">
-            <a:schemeClr val="accent1"/>
-          </a:fillRef>
-          <a:effectRef idx="0">
-            <a:schemeClr val="accent1"/>
-          </a:effectRef>
-          <a:fontRef idx="minor">
-            <a:schemeClr val="tx1"/>
-          </a:fontRef>
-        </p:style>
-      </p:cxnSp>
       <p:cxnSp>
         <p:nvCxnSpPr>
           <p:cNvPr id="36" name="Straight Connector 35">
@@ -9671,7 +10471,7 @@
         </p:nvCxnSpPr>
         <p:spPr>
           <a:xfrm>
-            <a:off x="4411363" y="1705233"/>
+            <a:off x="4821217" y="1705233"/>
             <a:ext cx="0" cy="2842051"/>
           </a:xfrm>
           <a:prstGeom prst="line">
@@ -9717,8 +10517,8 @@
         </p:nvCxnSpPr>
         <p:spPr>
           <a:xfrm>
-            <a:off x="4411363" y="1705233"/>
-            <a:ext cx="914399" cy="0"/>
+            <a:off x="4572000" y="1705233"/>
+            <a:ext cx="938961" cy="0"/>
           </a:xfrm>
           <a:prstGeom prst="straightConnector1">
             <a:avLst/>
@@ -9764,8 +10564,8 @@
         </p:nvCxnSpPr>
         <p:spPr>
           <a:xfrm>
-            <a:off x="4411363" y="3111843"/>
-            <a:ext cx="914399" cy="0"/>
+            <a:off x="4821217" y="3122860"/>
+            <a:ext cx="689744" cy="0"/>
           </a:xfrm>
           <a:prstGeom prst="straightConnector1">
             <a:avLst/>
@@ -9811,8 +10611,8 @@
         </p:nvCxnSpPr>
         <p:spPr>
           <a:xfrm>
-            <a:off x="4411363" y="4547284"/>
-            <a:ext cx="976182" cy="0"/>
+            <a:off x="4821217" y="4557155"/>
+            <a:ext cx="689744" cy="0"/>
           </a:xfrm>
           <a:prstGeom prst="straightConnector1">
             <a:avLst/>
@@ -10008,7 +10808,7 @@
         </p:blipFill>
         <p:spPr>
           <a:xfrm>
-            <a:off x="3970682" y="1353014"/>
+            <a:off x="4091869" y="1088606"/>
             <a:ext cx="562428" cy="562428"/>
           </a:xfrm>
           <a:prstGeom prst="rect">
@@ -10032,7 +10832,7 @@
             <p:ph idx="1"/>
             <p:extLst>
               <p:ext uri="{D42A27DB-BD31-4B8C-83A1-F6EECF244321}">
-                <p14:modId xmlns:p14="http://schemas.microsoft.com/office/powerpoint/2010/main" val="2175909452"/>
+                <p14:modId xmlns:p14="http://schemas.microsoft.com/office/powerpoint/2010/main" val="1896308066"/>
               </p:ext>
             </p:extLst>
           </p:nvPr>
@@ -10064,19 +10864,20 @@
                     <a:p>
                       <a:pPr algn="ctr"/>
                       <a:r>
-                        <a:rPr lang="en-US" dirty="0" err="1"/>
-                        <a:t>Orderer</a:t>
-                      </a:r>
-                      <a:r>
-                        <a:rPr lang="en-US" dirty="0"/>
-                        <a:t> policies</a:t>
-                      </a:r>
+                        <a:rPr lang="ru-RU" dirty="0"/>
+                        <a:t>Правила службы упорядочения</a:t>
+                      </a:r>
+                      <a:endParaRPr lang="en-US" dirty="0"/>
                     </a:p>
                     <a:p>
                       <a:pPr algn="ctr"/>
                       <a:r>
+                        <a:rPr lang="ru-RU" i="1" dirty="0"/>
+                        <a:t>Путь к правилам</a:t>
+                      </a:r>
+                      <a:r>
                         <a:rPr lang="en-US" i="1" dirty="0"/>
-                        <a:t>Policy path: Channel/</a:t>
+                        <a:t>: Channel/</a:t>
                       </a:r>
                       <a:r>
                         <a:rPr lang="en-US" i="1" dirty="0" err="1"/>
@@ -10144,22 +10945,42 @@
                     <a:p>
                       <a:pPr lvl="1"/>
                       <a:r>
-                        <a:rPr lang="en-US" sz="1600" dirty="0"/>
-                        <a:t>Policy Type: Implicit Meta</a:t>
+                        <a:rPr lang="ru-RU" sz="1600" dirty="0"/>
+                        <a:t>Тип правил</a:t>
+                      </a:r>
+                      <a:r>
+                        <a:rPr lang="en-US" sz="1600" dirty="0"/>
+                        <a:t>: Implicit Meta</a:t>
                       </a:r>
                     </a:p>
                     <a:p>
                       <a:pPr lvl="1"/>
                       <a:r>
-                        <a:rPr lang="en-US" sz="1600" dirty="0"/>
-                        <a:t>Rule: Majority Admins</a:t>
+                        <a:rPr lang="ru-RU" sz="1600" dirty="0"/>
+                        <a:t>Требование</a:t>
+                      </a:r>
+                      <a:r>
+                        <a:rPr lang="en-US" sz="1600" dirty="0"/>
+                        <a:t>: </a:t>
+                      </a:r>
+                      <a:r>
+                        <a:rPr lang="ru-RU" sz="1600" dirty="0"/>
+                        <a:t>Большинство с ролью</a:t>
+                      </a:r>
+                      <a:r>
+                        <a:rPr lang="en-US" sz="1600" dirty="0"/>
+                        <a:t> Admin</a:t>
                       </a:r>
                     </a:p>
                     <a:p>
                       <a:pPr lvl="1" algn="l"/>
                       <a:r>
+                        <a:rPr lang="ru-RU" sz="1600" i="1" dirty="0"/>
+                        <a:t>Путь</a:t>
+                      </a:r>
+                      <a:r>
                         <a:rPr lang="en-US" sz="1600" i="1" dirty="0"/>
-                        <a:t>Path: Channel/</a:t>
+                        <a:t>: Channel/</a:t>
                       </a:r>
                       <a:r>
                         <a:rPr lang="en-US" sz="1600" i="1" dirty="0" err="1"/>
@@ -10230,22 +11051,42 @@
                     <a:p>
                       <a:pPr lvl="1"/>
                       <a:r>
-                        <a:rPr lang="en-US" sz="1600" dirty="0"/>
-                        <a:t>Policy Type: Implicit Meta</a:t>
+                        <a:rPr lang="ru-RU" sz="1600" dirty="0"/>
+                        <a:t>Тип правил</a:t>
+                      </a:r>
+                      <a:r>
+                        <a:rPr lang="en-US" sz="1600" dirty="0"/>
+                        <a:t>: Implicit Meta</a:t>
                       </a:r>
                     </a:p>
                     <a:p>
                       <a:pPr lvl="1"/>
                       <a:r>
-                        <a:rPr lang="en-US" sz="1600" dirty="0"/>
-                        <a:t>Rule: Any Writers</a:t>
+                        <a:rPr lang="ru-RU" sz="1600" dirty="0"/>
+                        <a:t>Требование</a:t>
+                      </a:r>
+                      <a:r>
+                        <a:rPr lang="en-US" sz="1600" dirty="0"/>
+                        <a:t>: </a:t>
+                      </a:r>
+                      <a:r>
+                        <a:rPr lang="ru-RU" sz="1600" dirty="0"/>
+                        <a:t>Любые с ролью</a:t>
+                      </a:r>
+                      <a:r>
+                        <a:rPr lang="en-US" sz="1600" dirty="0"/>
+                        <a:t> Writer</a:t>
                       </a:r>
                     </a:p>
                     <a:p>
                       <a:pPr lvl="1" algn="l"/>
                       <a:r>
+                        <a:rPr lang="ru-RU" sz="1600" i="1" dirty="0"/>
+                        <a:t>Путь</a:t>
+                      </a:r>
+                      <a:r>
                         <a:rPr lang="en-US" sz="1600" i="1" dirty="0"/>
-                        <a:t>Path: Channel/</a:t>
+                        <a:t>: Channel/</a:t>
                       </a:r>
                       <a:r>
                         <a:rPr lang="en-US" sz="1600" i="1" dirty="0" err="1"/>
@@ -10316,22 +11157,38 @@
                     <a:p>
                       <a:pPr lvl="1"/>
                       <a:r>
-                        <a:rPr lang="en-US" sz="1600" dirty="0"/>
-                        <a:t>Policy Type: Implicit Meta</a:t>
+                        <a:rPr lang="ru-RU" sz="1600" dirty="0"/>
+                        <a:t>Тип правил</a:t>
+                      </a:r>
+                      <a:r>
+                        <a:rPr lang="en-US" sz="1600" dirty="0"/>
+                        <a:t>: Implicit Meta</a:t>
                       </a:r>
                     </a:p>
                     <a:p>
                       <a:pPr lvl="1"/>
                       <a:r>
                         <a:rPr lang="en-US" sz="1600" dirty="0"/>
-                        <a:t>Rule: Any Readers</a:t>
+                        <a:t>Rule: </a:t>
+                      </a:r>
+                      <a:r>
+                        <a:rPr lang="ru-RU" sz="1600" dirty="0"/>
+                        <a:t>Любые с ролью</a:t>
+                      </a:r>
+                      <a:r>
+                        <a:rPr lang="en-US" sz="1600" dirty="0"/>
+                        <a:t> Reader</a:t>
                       </a:r>
                     </a:p>
                     <a:p>
                       <a:pPr lvl="1" algn="l"/>
                       <a:r>
+                        <a:rPr lang="ru-RU" sz="1600" i="1" dirty="0"/>
+                        <a:t>Путь</a:t>
+                      </a:r>
+                      <a:r>
                         <a:rPr lang="en-US" sz="1600" i="1" dirty="0"/>
-                        <a:t>Path: Channel/</a:t>
+                        <a:t>: Channel/</a:t>
                       </a:r>
                       <a:r>
                         <a:rPr lang="en-US" sz="1600" i="1" dirty="0" err="1"/>
@@ -10403,22 +11260,42 @@
                     <a:p>
                       <a:pPr lvl="1"/>
                       <a:r>
-                        <a:rPr lang="en-US" sz="1600" dirty="0"/>
-                        <a:t>Policy Type: Implicit Meta</a:t>
+                        <a:rPr lang="ru-RU" sz="1600" dirty="0"/>
+                        <a:t>Тип правил</a:t>
+                      </a:r>
+                      <a:r>
+                        <a:rPr lang="en-US" sz="1600" dirty="0"/>
+                        <a:t>: Implicit Meta</a:t>
                       </a:r>
                     </a:p>
                     <a:p>
                       <a:pPr lvl="1"/>
                       <a:r>
-                        <a:rPr lang="en-US" sz="1600" dirty="0"/>
-                        <a:t>Rule: Any Writers</a:t>
+                        <a:rPr lang="ru-RU" sz="1600" dirty="0"/>
+                        <a:t>Требование</a:t>
+                      </a:r>
+                      <a:r>
+                        <a:rPr lang="en-US" sz="1600" dirty="0"/>
+                        <a:t>: </a:t>
+                      </a:r>
+                      <a:r>
+                        <a:rPr lang="ru-RU" sz="1600" dirty="0"/>
+                        <a:t>Любые с ролью</a:t>
+                      </a:r>
+                      <a:r>
+                        <a:rPr lang="en-US" sz="1600" dirty="0"/>
+                        <a:t> Writer</a:t>
                       </a:r>
                     </a:p>
                     <a:p>
                       <a:pPr lvl="1" algn="l"/>
                       <a:r>
+                        <a:rPr lang="ru-RU" sz="1600" i="1" dirty="0"/>
+                        <a:t>Путь</a:t>
+                      </a:r>
+                      <a:r>
                         <a:rPr lang="en-US" sz="1600" i="1" dirty="0"/>
-                        <a:t>Path: Channel/</a:t>
+                        <a:t>: Channel/</a:t>
                       </a:r>
                       <a:r>
                         <a:rPr lang="en-US" sz="1600" i="1" dirty="0" err="1"/>
@@ -10499,7 +11376,7 @@
           <p:nvPr>
             <p:extLst>
               <p:ext uri="{D42A27DB-BD31-4B8C-83A1-F6EECF244321}">
-                <p14:modId xmlns:p14="http://schemas.microsoft.com/office/powerpoint/2010/main" val="2566951041"/>
+                <p14:modId xmlns:p14="http://schemas.microsoft.com/office/powerpoint/2010/main" val="216665908"/>
               </p:ext>
             </p:extLst>
           </p:nvPr>
@@ -10531,9 +11408,10 @@
                     <a:p>
                       <a:pPr algn="ctr"/>
                       <a:r>
-                        <a:rPr lang="en-US" dirty="0"/>
-                        <a:t>Ordering service Organizations</a:t>
-                      </a:r>
+                        <a:rPr lang="ru-RU" dirty="0"/>
+                        <a:t>Организации службы упорядочения</a:t>
+                      </a:r>
+                      <a:endParaRPr lang="en-US" dirty="0"/>
                     </a:p>
                   </a:txBody>
                   <a:tcPr>
@@ -10594,8 +11472,12 @@
                     </a:p>
                     <a:p>
                       <a:r>
-                        <a:rPr lang="en-US" sz="1600" dirty="0"/>
-                        <a:t>Signature Policies:</a:t>
+                        <a:rPr lang="ru-RU" sz="1600" dirty="0"/>
+                        <a:t>Правила подписи</a:t>
+                      </a:r>
+                      <a:r>
+                        <a:rPr lang="en-US" sz="1600" dirty="0"/>
+                        <a:t>:</a:t>
                       </a:r>
                     </a:p>
                     <a:p>
@@ -10678,8 +11560,12 @@
                     </a:p>
                     <a:p>
                       <a:r>
-                        <a:rPr lang="en-US" sz="1600" dirty="0"/>
-                        <a:t>Signature Policies:</a:t>
+                        <a:rPr lang="ru-RU" sz="1600" dirty="0"/>
+                        <a:t>Правила подписи</a:t>
+                      </a:r>
+                      <a:r>
+                        <a:rPr lang="en-US" sz="1600" dirty="0"/>
+                        <a:t>:</a:t>
                       </a:r>
                     </a:p>
                     <a:p>
@@ -10762,8 +11648,12 @@
                     </a:p>
                     <a:p>
                       <a:r>
-                        <a:rPr lang="en-US" sz="1600" dirty="0"/>
-                        <a:t>Signature Policies:</a:t>
+                        <a:rPr lang="ru-RU" sz="1600" dirty="0"/>
+                        <a:t>Правила подписи</a:t>
+                      </a:r>
+                      <a:r>
+                        <a:rPr lang="en-US" sz="1600" dirty="0"/>
+                        <a:t>:</a:t>
                       </a:r>
                     </a:p>
                     <a:p>

</xml_diff>